<commit_message>
update the keyboard function name
</commit_message>
<xml_diff>
--- a/Exercies/Exercies04/Exercise04.pptx
+++ b/Exercies/Exercies04/Exercise04.pptx
@@ -31,7 +31,7 @@
   <p:notesSz cx="6858000" cy="9144000"/>
   <p:defaultTextStyle>
     <a:defPPr>
-      <a:defRPr lang="zh-CN"/>
+      <a:defRPr lang="zh-CHS"/>
     </a:defPPr>
     <a:lvl1pPr marL="0" algn="l" defTabSz="914400" rtl="0" eaLnBrk="1" latinLnBrk="0" hangingPunct="1">
       <a:defRPr sz="1800" kern="1200">
@@ -124,6 +124,22 @@
       </a:defRPr>
     </a:lvl9pPr>
   </p:defaultTextStyle>
+  <p:extLst>
+    <p:ext uri="{EFAFB233-063F-42B5-8137-9DF3F51BA10A}">
+      <p15:sldGuideLst xmlns:p15="http://schemas.microsoft.com/office/powerpoint/2012/main">
+        <p15:guide id="1" orient="horz" pos="2160">
+          <p15:clr>
+            <a:srgbClr val="A4A3A4"/>
+          </p15:clr>
+        </p15:guide>
+        <p15:guide id="2" pos="2880">
+          <p15:clr>
+            <a:srgbClr val="A4A3A4"/>
+          </p15:clr>
+        </p15:guide>
+      </p15:sldGuideLst>
+    </p:ext>
+  </p:extLst>
 </p:presentation>
 </file>
 
@@ -262,7 +278,7 @@
           </a:lstStyle>
           <a:p>
             <a:r>
-              <a:rPr kumimoji="0" lang="zh-CN" altLang="en-US" smtClean="0"/>
+              <a:rPr kumimoji="0" lang="zh-CHS" altLang="en-US" smtClean="0"/>
               <a:t>单击此处编辑母版标题样式</a:t>
             </a:r>
             <a:endParaRPr kumimoji="0" lang="en-US"/>
@@ -324,7 +340,7 @@
           </a:lstStyle>
           <a:p>
             <a:r>
-              <a:rPr kumimoji="0" lang="zh-CN" altLang="en-US" smtClean="0"/>
+              <a:rPr kumimoji="0" lang="zh-CHS" altLang="en-US" smtClean="0"/>
               <a:t>单击此处编辑母版副标题样式</a:t>
             </a:r>
             <a:endParaRPr kumimoji="0" lang="en-US"/>
@@ -751,11 +767,11 @@
           </a:lstStyle>
           <a:p>
             <a:fld id="{530820CF-B880-4189-942D-D702A7CBA730}" type="datetimeFigureOut">
-              <a:rPr lang="zh-CN" altLang="en-US" smtClean="0"/>
+              <a:rPr lang="zh-CHS" altLang="en-US" smtClean="0"/>
               <a:pPr/>
-              <a:t>2015/3/29</a:t>
+              <a:t>15/3/30</a:t>
             </a:fld>
-            <a:endParaRPr lang="zh-CN" altLang="en-US"/>
+            <a:endParaRPr lang="zh-CHS" altLang="en-US"/>
           </a:p>
         </p:txBody>
       </p:sp>
@@ -785,7 +801,7 @@
             <a:extLst/>
           </a:lstStyle>
           <a:p>
-            <a:endParaRPr lang="zh-CN" altLang="en-US"/>
+            <a:endParaRPr lang="zh-CHS" altLang="en-US"/>
           </a:p>
         </p:txBody>
       </p:sp>
@@ -814,11 +830,11 @@
           </a:lstStyle>
           <a:p>
             <a:fld id="{0C913308-F349-4B6D-A68A-DD1791B4A57B}" type="slidenum">
-              <a:rPr lang="zh-CN" altLang="en-US" smtClean="0"/>
+              <a:rPr lang="zh-CHS" altLang="en-US" smtClean="0"/>
               <a:pPr/>
               <a:t>‹#›</a:t>
             </a:fld>
-            <a:endParaRPr lang="zh-CN" altLang="en-US"/>
+            <a:endParaRPr lang="zh-CHS" altLang="en-US"/>
           </a:p>
         </p:txBody>
       </p:sp>
@@ -865,7 +881,7 @@
           </a:lstStyle>
           <a:p>
             <a:r>
-              <a:rPr kumimoji="0" lang="zh-CN" altLang="en-US" smtClean="0"/>
+              <a:rPr kumimoji="0" lang="zh-CHS" altLang="en-US" smtClean="0"/>
               <a:t>单击此处编辑母版标题样式</a:t>
             </a:r>
             <a:endParaRPr kumimoji="0" lang="en-US"/>
@@ -896,35 +912,35 @@
           <a:p>
             <a:pPr lvl="0" eaLnBrk="1" latinLnBrk="0" hangingPunct="1"/>
             <a:r>
-              <a:rPr lang="zh-CN" altLang="en-US" smtClean="0"/>
+              <a:rPr lang="zh-CHS" altLang="en-US" smtClean="0"/>
               <a:t>单击此处编辑母版文本样式</a:t>
             </a:r>
           </a:p>
           <a:p>
             <a:pPr lvl="1" eaLnBrk="1" latinLnBrk="0" hangingPunct="1"/>
             <a:r>
-              <a:rPr lang="zh-CN" altLang="en-US" smtClean="0"/>
+              <a:rPr lang="zh-CHS" altLang="en-US" smtClean="0"/>
               <a:t>第二级</a:t>
             </a:r>
           </a:p>
           <a:p>
             <a:pPr lvl="2" eaLnBrk="1" latinLnBrk="0" hangingPunct="1"/>
             <a:r>
-              <a:rPr lang="zh-CN" altLang="en-US" smtClean="0"/>
+              <a:rPr lang="zh-CHS" altLang="en-US" smtClean="0"/>
               <a:t>第三级</a:t>
             </a:r>
           </a:p>
           <a:p>
             <a:pPr lvl="3" eaLnBrk="1" latinLnBrk="0" hangingPunct="1"/>
             <a:r>
-              <a:rPr lang="zh-CN" altLang="en-US" smtClean="0"/>
+              <a:rPr lang="zh-CHS" altLang="en-US" smtClean="0"/>
               <a:t>第四级</a:t>
             </a:r>
           </a:p>
           <a:p>
             <a:pPr lvl="4" eaLnBrk="1" latinLnBrk="0" hangingPunct="1"/>
             <a:r>
-              <a:rPr lang="zh-CN" altLang="en-US" smtClean="0"/>
+              <a:rPr lang="zh-CHS" altLang="en-US" smtClean="0"/>
               <a:t>第五级</a:t>
             </a:r>
             <a:endParaRPr kumimoji="0" lang="en-US"/>
@@ -949,11 +965,11 @@
           </a:lstStyle>
           <a:p>
             <a:fld id="{530820CF-B880-4189-942D-D702A7CBA730}" type="datetimeFigureOut">
-              <a:rPr lang="zh-CN" altLang="en-US" smtClean="0"/>
+              <a:rPr lang="zh-CHS" altLang="en-US" smtClean="0"/>
               <a:pPr/>
-              <a:t>2015/3/29</a:t>
+              <a:t>15/3/30</a:t>
             </a:fld>
-            <a:endParaRPr lang="zh-CN" altLang="en-US"/>
+            <a:endParaRPr lang="zh-CHS" altLang="en-US"/>
           </a:p>
         </p:txBody>
       </p:sp>
@@ -974,7 +990,7 @@
             <a:extLst/>
           </a:lstStyle>
           <a:p>
-            <a:endParaRPr lang="zh-CN" altLang="en-US"/>
+            <a:endParaRPr lang="zh-CHS" altLang="en-US"/>
           </a:p>
         </p:txBody>
       </p:sp>
@@ -996,11 +1012,11 @@
           </a:lstStyle>
           <a:p>
             <a:fld id="{0C913308-F349-4B6D-A68A-DD1791B4A57B}" type="slidenum">
-              <a:rPr lang="zh-CN" altLang="en-US" smtClean="0"/>
+              <a:rPr lang="zh-CHS" altLang="en-US" smtClean="0"/>
               <a:pPr/>
               <a:t>‹#›</a:t>
             </a:fld>
-            <a:endParaRPr lang="zh-CN" altLang="en-US"/>
+            <a:endParaRPr lang="zh-CHS" altLang="en-US"/>
           </a:p>
         </p:txBody>
       </p:sp>
@@ -1052,7 +1068,7 @@
           </a:lstStyle>
           <a:p>
             <a:r>
-              <a:rPr kumimoji="0" lang="zh-CN" altLang="en-US" smtClean="0"/>
+              <a:rPr kumimoji="0" lang="zh-CHS" altLang="en-US" smtClean="0"/>
               <a:t>单击此处编辑母版标题样式</a:t>
             </a:r>
             <a:endParaRPr kumimoji="0" lang="en-US"/>
@@ -1083,35 +1099,35 @@
           <a:p>
             <a:pPr lvl="0" eaLnBrk="1" latinLnBrk="0" hangingPunct="1"/>
             <a:r>
-              <a:rPr lang="zh-CN" altLang="en-US" smtClean="0"/>
+              <a:rPr lang="zh-CHS" altLang="en-US" smtClean="0"/>
               <a:t>单击此处编辑母版文本样式</a:t>
             </a:r>
           </a:p>
           <a:p>
             <a:pPr lvl="1" eaLnBrk="1" latinLnBrk="0" hangingPunct="1"/>
             <a:r>
-              <a:rPr lang="zh-CN" altLang="en-US" smtClean="0"/>
+              <a:rPr lang="zh-CHS" altLang="en-US" smtClean="0"/>
               <a:t>第二级</a:t>
             </a:r>
           </a:p>
           <a:p>
             <a:pPr lvl="2" eaLnBrk="1" latinLnBrk="0" hangingPunct="1"/>
             <a:r>
-              <a:rPr lang="zh-CN" altLang="en-US" smtClean="0"/>
+              <a:rPr lang="zh-CHS" altLang="en-US" smtClean="0"/>
               <a:t>第三级</a:t>
             </a:r>
           </a:p>
           <a:p>
             <a:pPr lvl="3" eaLnBrk="1" latinLnBrk="0" hangingPunct="1"/>
             <a:r>
-              <a:rPr lang="zh-CN" altLang="en-US" smtClean="0"/>
+              <a:rPr lang="zh-CHS" altLang="en-US" smtClean="0"/>
               <a:t>第四级</a:t>
             </a:r>
           </a:p>
           <a:p>
             <a:pPr lvl="4" eaLnBrk="1" latinLnBrk="0" hangingPunct="1"/>
             <a:r>
-              <a:rPr lang="zh-CN" altLang="en-US" smtClean="0"/>
+              <a:rPr lang="zh-CHS" altLang="en-US" smtClean="0"/>
               <a:t>第五级</a:t>
             </a:r>
             <a:endParaRPr kumimoji="0" lang="en-US"/>
@@ -1136,11 +1152,11 @@
           </a:lstStyle>
           <a:p>
             <a:fld id="{530820CF-B880-4189-942D-D702A7CBA730}" type="datetimeFigureOut">
-              <a:rPr lang="zh-CN" altLang="en-US" smtClean="0"/>
+              <a:rPr lang="zh-CHS" altLang="en-US" smtClean="0"/>
               <a:pPr/>
-              <a:t>2015/3/29</a:t>
+              <a:t>15/3/30</a:t>
             </a:fld>
-            <a:endParaRPr lang="zh-CN" altLang="en-US"/>
+            <a:endParaRPr lang="zh-CHS" altLang="en-US"/>
           </a:p>
         </p:txBody>
       </p:sp>
@@ -1161,7 +1177,7 @@
             <a:extLst/>
           </a:lstStyle>
           <a:p>
-            <a:endParaRPr lang="zh-CN" altLang="en-US"/>
+            <a:endParaRPr lang="zh-CHS" altLang="en-US"/>
           </a:p>
         </p:txBody>
       </p:sp>
@@ -1183,11 +1199,11 @@
           </a:lstStyle>
           <a:p>
             <a:fld id="{0C913308-F349-4B6D-A68A-DD1791B4A57B}" type="slidenum">
-              <a:rPr lang="zh-CN" altLang="en-US" smtClean="0"/>
+              <a:rPr lang="zh-CHS" altLang="en-US" smtClean="0"/>
               <a:pPr/>
               <a:t>‹#›</a:t>
             </a:fld>
-            <a:endParaRPr lang="zh-CN" altLang="en-US"/>
+            <a:endParaRPr lang="zh-CHS" altLang="en-US"/>
           </a:p>
         </p:txBody>
       </p:sp>
@@ -1235,35 +1251,35 @@
           <a:p>
             <a:pPr lvl="0" eaLnBrk="1" latinLnBrk="0" hangingPunct="1"/>
             <a:r>
-              <a:rPr lang="zh-CN" altLang="en-US" smtClean="0"/>
+              <a:rPr lang="zh-CHS" altLang="en-US" smtClean="0"/>
               <a:t>单击此处编辑母版文本样式</a:t>
             </a:r>
           </a:p>
           <a:p>
             <a:pPr lvl="1" eaLnBrk="1" latinLnBrk="0" hangingPunct="1"/>
             <a:r>
-              <a:rPr lang="zh-CN" altLang="en-US" smtClean="0"/>
+              <a:rPr lang="zh-CHS" altLang="en-US" smtClean="0"/>
               <a:t>第二级</a:t>
             </a:r>
           </a:p>
           <a:p>
             <a:pPr lvl="2" eaLnBrk="1" latinLnBrk="0" hangingPunct="1"/>
             <a:r>
-              <a:rPr lang="zh-CN" altLang="en-US" smtClean="0"/>
+              <a:rPr lang="zh-CHS" altLang="en-US" smtClean="0"/>
               <a:t>第三级</a:t>
             </a:r>
           </a:p>
           <a:p>
             <a:pPr lvl="3" eaLnBrk="1" latinLnBrk="0" hangingPunct="1"/>
             <a:r>
-              <a:rPr lang="zh-CN" altLang="en-US" smtClean="0"/>
+              <a:rPr lang="zh-CHS" altLang="en-US" smtClean="0"/>
               <a:t>第四级</a:t>
             </a:r>
           </a:p>
           <a:p>
             <a:pPr lvl="4" eaLnBrk="1" latinLnBrk="0" hangingPunct="1"/>
             <a:r>
-              <a:rPr lang="zh-CN" altLang="en-US" smtClean="0"/>
+              <a:rPr lang="zh-CHS" altLang="en-US" smtClean="0"/>
               <a:t>第五级</a:t>
             </a:r>
             <a:endParaRPr kumimoji="0" lang="en-US"/>
@@ -1288,11 +1304,11 @@
           </a:lstStyle>
           <a:p>
             <a:fld id="{530820CF-B880-4189-942D-D702A7CBA730}" type="datetimeFigureOut">
-              <a:rPr lang="zh-CN" altLang="en-US" smtClean="0"/>
+              <a:rPr lang="zh-CHS" altLang="en-US" smtClean="0"/>
               <a:pPr/>
-              <a:t>2015/3/29</a:t>
+              <a:t>15/3/30</a:t>
             </a:fld>
-            <a:endParaRPr lang="zh-CN" altLang="en-US"/>
+            <a:endParaRPr lang="zh-CHS" altLang="en-US"/>
           </a:p>
         </p:txBody>
       </p:sp>
@@ -1313,7 +1329,7 @@
             <a:extLst/>
           </a:lstStyle>
           <a:p>
-            <a:endParaRPr lang="zh-CN" altLang="en-US"/>
+            <a:endParaRPr lang="zh-CHS" altLang="en-US"/>
           </a:p>
         </p:txBody>
       </p:sp>
@@ -1335,11 +1351,11 @@
           </a:lstStyle>
           <a:p>
             <a:fld id="{0C913308-F349-4B6D-A68A-DD1791B4A57B}" type="slidenum">
-              <a:rPr lang="zh-CN" altLang="en-US" smtClean="0"/>
+              <a:rPr lang="zh-CHS" altLang="en-US" smtClean="0"/>
               <a:pPr/>
               <a:t>‹#›</a:t>
             </a:fld>
-            <a:endParaRPr lang="zh-CN" altLang="en-US"/>
+            <a:endParaRPr lang="zh-CHS" altLang="en-US"/>
           </a:p>
         </p:txBody>
       </p:sp>
@@ -1361,7 +1377,7 @@
           </a:lstStyle>
           <a:p>
             <a:r>
-              <a:rPr kumimoji="0" lang="zh-CN" altLang="en-US" smtClean="0"/>
+              <a:rPr kumimoji="0" lang="zh-CHS" altLang="en-US" smtClean="0"/>
               <a:t>单击此处编辑母版标题样式</a:t>
             </a:r>
             <a:endParaRPr kumimoji="0" lang="en-US"/>
@@ -1437,7 +1453,7 @@
           </a:lstStyle>
           <a:p>
             <a:r>
-              <a:rPr kumimoji="0" lang="zh-CN" altLang="en-US" smtClean="0"/>
+              <a:rPr kumimoji="0" lang="zh-CHS" altLang="en-US" smtClean="0"/>
               <a:t>单击此处编辑母版标题样式</a:t>
             </a:r>
             <a:endParaRPr kumimoji="0" lang="en-US"/>
@@ -1516,7 +1532,7 @@
           <a:p>
             <a:pPr lvl="0" eaLnBrk="1" latinLnBrk="0" hangingPunct="1"/>
             <a:r>
-              <a:rPr kumimoji="0" lang="zh-CN" altLang="en-US" smtClean="0"/>
+              <a:rPr kumimoji="0" lang="zh-CHS" altLang="en-US" smtClean="0"/>
               <a:t>单击此处编辑母版文本样式</a:t>
             </a:r>
           </a:p>
@@ -1540,11 +1556,11 @@
           </a:lstStyle>
           <a:p>
             <a:fld id="{530820CF-B880-4189-942D-D702A7CBA730}" type="datetimeFigureOut">
-              <a:rPr lang="zh-CN" altLang="en-US" smtClean="0"/>
+              <a:rPr lang="zh-CHS" altLang="en-US" smtClean="0"/>
               <a:pPr/>
-              <a:t>2015/3/29</a:t>
+              <a:t>15/3/30</a:t>
             </a:fld>
-            <a:endParaRPr lang="zh-CN" altLang="en-US"/>
+            <a:endParaRPr lang="zh-CHS" altLang="en-US"/>
           </a:p>
         </p:txBody>
       </p:sp>
@@ -1565,7 +1581,7 @@
             <a:extLst/>
           </a:lstStyle>
           <a:p>
-            <a:endParaRPr lang="zh-CN" altLang="en-US"/>
+            <a:endParaRPr lang="zh-CHS" altLang="en-US"/>
           </a:p>
         </p:txBody>
       </p:sp>
@@ -1587,11 +1603,11 @@
           </a:lstStyle>
           <a:p>
             <a:fld id="{0C913308-F349-4B6D-A68A-DD1791B4A57B}" type="slidenum">
-              <a:rPr lang="zh-CN" altLang="en-US" smtClean="0"/>
+              <a:rPr lang="zh-CHS" altLang="en-US" smtClean="0"/>
               <a:pPr/>
               <a:t>‹#›</a:t>
             </a:fld>
-            <a:endParaRPr lang="zh-CN" altLang="en-US"/>
+            <a:endParaRPr lang="zh-CHS" altLang="en-US"/>
           </a:p>
         </p:txBody>
       </p:sp>
@@ -1819,35 +1835,35 @@
           <a:p>
             <a:pPr lvl="0" eaLnBrk="1" latinLnBrk="0" hangingPunct="1"/>
             <a:r>
-              <a:rPr lang="zh-CN" altLang="en-US" smtClean="0"/>
+              <a:rPr lang="zh-CHS" altLang="en-US" smtClean="0"/>
               <a:t>单击此处编辑母版文本样式</a:t>
             </a:r>
           </a:p>
           <a:p>
             <a:pPr lvl="1" eaLnBrk="1" latinLnBrk="0" hangingPunct="1"/>
             <a:r>
-              <a:rPr lang="zh-CN" altLang="en-US" smtClean="0"/>
+              <a:rPr lang="zh-CHS" altLang="en-US" smtClean="0"/>
               <a:t>第二级</a:t>
             </a:r>
           </a:p>
           <a:p>
             <a:pPr lvl="2" eaLnBrk="1" latinLnBrk="0" hangingPunct="1"/>
             <a:r>
-              <a:rPr lang="zh-CN" altLang="en-US" smtClean="0"/>
+              <a:rPr lang="zh-CHS" altLang="en-US" smtClean="0"/>
               <a:t>第三级</a:t>
             </a:r>
           </a:p>
           <a:p>
             <a:pPr lvl="3" eaLnBrk="1" latinLnBrk="0" hangingPunct="1"/>
             <a:r>
-              <a:rPr lang="zh-CN" altLang="en-US" smtClean="0"/>
+              <a:rPr lang="zh-CHS" altLang="en-US" smtClean="0"/>
               <a:t>第四级</a:t>
             </a:r>
           </a:p>
           <a:p>
             <a:pPr lvl="4" eaLnBrk="1" latinLnBrk="0" hangingPunct="1"/>
             <a:r>
-              <a:rPr lang="zh-CN" altLang="en-US" smtClean="0"/>
+              <a:rPr lang="zh-CHS" altLang="en-US" smtClean="0"/>
               <a:t>第五级</a:t>
             </a:r>
             <a:endParaRPr kumimoji="0" lang="en-US"/>
@@ -1893,35 +1909,35 @@
           <a:p>
             <a:pPr lvl="0" eaLnBrk="1" latinLnBrk="0" hangingPunct="1"/>
             <a:r>
-              <a:rPr lang="zh-CN" altLang="en-US" smtClean="0"/>
+              <a:rPr lang="zh-CHS" altLang="en-US" smtClean="0"/>
               <a:t>单击此处编辑母版文本样式</a:t>
             </a:r>
           </a:p>
           <a:p>
             <a:pPr lvl="1" eaLnBrk="1" latinLnBrk="0" hangingPunct="1"/>
             <a:r>
-              <a:rPr lang="zh-CN" altLang="en-US" smtClean="0"/>
+              <a:rPr lang="zh-CHS" altLang="en-US" smtClean="0"/>
               <a:t>第二级</a:t>
             </a:r>
           </a:p>
           <a:p>
             <a:pPr lvl="2" eaLnBrk="1" latinLnBrk="0" hangingPunct="1"/>
             <a:r>
-              <a:rPr lang="zh-CN" altLang="en-US" smtClean="0"/>
+              <a:rPr lang="zh-CHS" altLang="en-US" smtClean="0"/>
               <a:t>第三级</a:t>
             </a:r>
           </a:p>
           <a:p>
             <a:pPr lvl="3" eaLnBrk="1" latinLnBrk="0" hangingPunct="1"/>
             <a:r>
-              <a:rPr lang="zh-CN" altLang="en-US" smtClean="0"/>
+              <a:rPr lang="zh-CHS" altLang="en-US" smtClean="0"/>
               <a:t>第四级</a:t>
             </a:r>
           </a:p>
           <a:p>
             <a:pPr lvl="4" eaLnBrk="1" latinLnBrk="0" hangingPunct="1"/>
             <a:r>
-              <a:rPr lang="zh-CN" altLang="en-US" smtClean="0"/>
+              <a:rPr lang="zh-CHS" altLang="en-US" smtClean="0"/>
               <a:t>第五级</a:t>
             </a:r>
             <a:endParaRPr kumimoji="0" lang="en-US"/>
@@ -1946,11 +1962,11 @@
           </a:lstStyle>
           <a:p>
             <a:fld id="{530820CF-B880-4189-942D-D702A7CBA730}" type="datetimeFigureOut">
-              <a:rPr lang="zh-CN" altLang="en-US" smtClean="0"/>
+              <a:rPr lang="zh-CHS" altLang="en-US" smtClean="0"/>
               <a:pPr/>
-              <a:t>2015/3/29</a:t>
+              <a:t>15/3/30</a:t>
             </a:fld>
-            <a:endParaRPr lang="zh-CN" altLang="en-US"/>
+            <a:endParaRPr lang="zh-CHS" altLang="en-US"/>
           </a:p>
         </p:txBody>
       </p:sp>
@@ -1971,7 +1987,7 @@
             <a:extLst/>
           </a:lstStyle>
           <a:p>
-            <a:endParaRPr lang="zh-CN" altLang="en-US"/>
+            <a:endParaRPr lang="zh-CHS" altLang="en-US"/>
           </a:p>
         </p:txBody>
       </p:sp>
@@ -1993,11 +2009,11 @@
           </a:lstStyle>
           <a:p>
             <a:fld id="{0C913308-F349-4B6D-A68A-DD1791B4A57B}" type="slidenum">
-              <a:rPr lang="zh-CN" altLang="en-US" smtClean="0"/>
+              <a:rPr lang="zh-CHS" altLang="en-US" smtClean="0"/>
               <a:pPr/>
               <a:t>‹#›</a:t>
             </a:fld>
-            <a:endParaRPr lang="zh-CN" altLang="en-US"/>
+            <a:endParaRPr lang="zh-CHS" altLang="en-US"/>
           </a:p>
         </p:txBody>
       </p:sp>
@@ -2019,7 +2035,7 @@
           </a:lstStyle>
           <a:p>
             <a:r>
-              <a:rPr kumimoji="0" lang="zh-CN" altLang="en-US" smtClean="0"/>
+              <a:rPr kumimoji="0" lang="zh-CHS" altLang="en-US" smtClean="0"/>
               <a:t>单击此处编辑母版标题样式</a:t>
             </a:r>
             <a:endParaRPr kumimoji="0" lang="en-US"/>
@@ -2077,7 +2093,7 @@
           </a:lstStyle>
           <a:p>
             <a:r>
-              <a:rPr kumimoji="0" lang="zh-CN" altLang="en-US" smtClean="0"/>
+              <a:rPr kumimoji="0" lang="zh-CHS" altLang="en-US" smtClean="0"/>
               <a:t>单击此处编辑母版标题样式</a:t>
             </a:r>
             <a:endParaRPr kumimoji="0" lang="en-US"/>
@@ -2141,7 +2157,7 @@
           <a:p>
             <a:pPr lvl="0" eaLnBrk="1" latinLnBrk="0" hangingPunct="1"/>
             <a:r>
-              <a:rPr kumimoji="0" lang="zh-CN" altLang="en-US" smtClean="0"/>
+              <a:rPr kumimoji="0" lang="zh-CHS" altLang="en-US" smtClean="0"/>
               <a:t>单击此处编辑母版文本样式</a:t>
             </a:r>
           </a:p>
@@ -2204,7 +2220,7 @@
           <a:p>
             <a:pPr lvl="0" eaLnBrk="1" latinLnBrk="0" hangingPunct="1"/>
             <a:r>
-              <a:rPr kumimoji="0" lang="zh-CN" altLang="en-US" smtClean="0"/>
+              <a:rPr kumimoji="0" lang="zh-CHS" altLang="en-US" smtClean="0"/>
               <a:t>单击此处编辑母版文本样式</a:t>
             </a:r>
           </a:p>
@@ -2254,35 +2270,35 @@
           <a:p>
             <a:pPr lvl="0" eaLnBrk="1" latinLnBrk="0" hangingPunct="1"/>
             <a:r>
-              <a:rPr lang="zh-CN" altLang="en-US" smtClean="0"/>
+              <a:rPr lang="zh-CHS" altLang="en-US" smtClean="0"/>
               <a:t>单击此处编辑母版文本样式</a:t>
             </a:r>
           </a:p>
           <a:p>
             <a:pPr lvl="1" eaLnBrk="1" latinLnBrk="0" hangingPunct="1"/>
             <a:r>
-              <a:rPr lang="zh-CN" altLang="en-US" smtClean="0"/>
+              <a:rPr lang="zh-CHS" altLang="en-US" smtClean="0"/>
               <a:t>第二级</a:t>
             </a:r>
           </a:p>
           <a:p>
             <a:pPr lvl="2" eaLnBrk="1" latinLnBrk="0" hangingPunct="1"/>
             <a:r>
-              <a:rPr lang="zh-CN" altLang="en-US" smtClean="0"/>
+              <a:rPr lang="zh-CHS" altLang="en-US" smtClean="0"/>
               <a:t>第三级</a:t>
             </a:r>
           </a:p>
           <a:p>
             <a:pPr lvl="3" eaLnBrk="1" latinLnBrk="0" hangingPunct="1"/>
             <a:r>
-              <a:rPr lang="zh-CN" altLang="en-US" smtClean="0"/>
+              <a:rPr lang="zh-CHS" altLang="en-US" smtClean="0"/>
               <a:t>第四级</a:t>
             </a:r>
           </a:p>
           <a:p>
             <a:pPr lvl="4" eaLnBrk="1" latinLnBrk="0" hangingPunct="1"/>
             <a:r>
-              <a:rPr lang="zh-CN" altLang="en-US" smtClean="0"/>
+              <a:rPr lang="zh-CHS" altLang="en-US" smtClean="0"/>
               <a:t>第五级</a:t>
             </a:r>
             <a:endParaRPr kumimoji="0" lang="en-US"/>
@@ -2336,35 +2352,35 @@
           <a:p>
             <a:pPr lvl="0" eaLnBrk="1" latinLnBrk="0" hangingPunct="1"/>
             <a:r>
-              <a:rPr lang="zh-CN" altLang="en-US" smtClean="0"/>
+              <a:rPr lang="zh-CHS" altLang="en-US" smtClean="0"/>
               <a:t>单击此处编辑母版文本样式</a:t>
             </a:r>
           </a:p>
           <a:p>
             <a:pPr lvl="1" eaLnBrk="1" latinLnBrk="0" hangingPunct="1"/>
             <a:r>
-              <a:rPr lang="zh-CN" altLang="en-US" smtClean="0"/>
+              <a:rPr lang="zh-CHS" altLang="en-US" smtClean="0"/>
               <a:t>第二级</a:t>
             </a:r>
           </a:p>
           <a:p>
             <a:pPr lvl="2" eaLnBrk="1" latinLnBrk="0" hangingPunct="1"/>
             <a:r>
-              <a:rPr lang="zh-CN" altLang="en-US" smtClean="0"/>
+              <a:rPr lang="zh-CHS" altLang="en-US" smtClean="0"/>
               <a:t>第三级</a:t>
             </a:r>
           </a:p>
           <a:p>
             <a:pPr lvl="3" eaLnBrk="1" latinLnBrk="0" hangingPunct="1"/>
             <a:r>
-              <a:rPr lang="zh-CN" altLang="en-US" smtClean="0"/>
+              <a:rPr lang="zh-CHS" altLang="en-US" smtClean="0"/>
               <a:t>第四级</a:t>
             </a:r>
           </a:p>
           <a:p>
             <a:pPr lvl="4" eaLnBrk="1" latinLnBrk="0" hangingPunct="1"/>
             <a:r>
-              <a:rPr lang="zh-CN" altLang="en-US" smtClean="0"/>
+              <a:rPr lang="zh-CHS" altLang="en-US" smtClean="0"/>
               <a:t>第五级</a:t>
             </a:r>
             <a:endParaRPr kumimoji="0" lang="en-US"/>
@@ -2389,11 +2405,11 @@
           </a:lstStyle>
           <a:p>
             <a:fld id="{530820CF-B880-4189-942D-D702A7CBA730}" type="datetimeFigureOut">
-              <a:rPr lang="zh-CN" altLang="en-US" smtClean="0"/>
+              <a:rPr lang="zh-CHS" altLang="en-US" smtClean="0"/>
               <a:pPr/>
-              <a:t>2015/3/29</a:t>
+              <a:t>15/3/30</a:t>
             </a:fld>
-            <a:endParaRPr lang="zh-CN" altLang="en-US"/>
+            <a:endParaRPr lang="zh-CHS" altLang="en-US"/>
           </a:p>
         </p:txBody>
       </p:sp>
@@ -2414,7 +2430,7 @@
             <a:extLst/>
           </a:lstStyle>
           <a:p>
-            <a:endParaRPr lang="zh-CN" altLang="en-US"/>
+            <a:endParaRPr lang="zh-CHS" altLang="en-US"/>
           </a:p>
         </p:txBody>
       </p:sp>
@@ -2436,11 +2452,11 @@
           </a:lstStyle>
           <a:p>
             <a:fld id="{0C913308-F349-4B6D-A68A-DD1791B4A57B}" type="slidenum">
-              <a:rPr lang="zh-CN" altLang="en-US" smtClean="0"/>
+              <a:rPr lang="zh-CHS" altLang="en-US" smtClean="0"/>
               <a:pPr/>
               <a:t>‹#›</a:t>
             </a:fld>
-            <a:endParaRPr lang="zh-CN" altLang="en-US"/>
+            <a:endParaRPr lang="zh-CHS" altLang="en-US"/>
           </a:p>
         </p:txBody>
       </p:sp>
@@ -2487,11 +2503,11 @@
           </a:lstStyle>
           <a:p>
             <a:fld id="{530820CF-B880-4189-942D-D702A7CBA730}" type="datetimeFigureOut">
-              <a:rPr lang="zh-CN" altLang="en-US" smtClean="0"/>
+              <a:rPr lang="zh-CHS" altLang="en-US" smtClean="0"/>
               <a:pPr/>
-              <a:t>2015/3/29</a:t>
+              <a:t>15/3/30</a:t>
             </a:fld>
-            <a:endParaRPr lang="zh-CN" altLang="en-US"/>
+            <a:endParaRPr lang="zh-CHS" altLang="en-US"/>
           </a:p>
         </p:txBody>
       </p:sp>
@@ -2512,7 +2528,7 @@
             <a:extLst/>
           </a:lstStyle>
           <a:p>
-            <a:endParaRPr lang="zh-CN" altLang="en-US"/>
+            <a:endParaRPr lang="zh-CHS" altLang="en-US"/>
           </a:p>
         </p:txBody>
       </p:sp>
@@ -2534,11 +2550,11 @@
           </a:lstStyle>
           <a:p>
             <a:fld id="{0C913308-F349-4B6D-A68A-DD1791B4A57B}" type="slidenum">
-              <a:rPr lang="zh-CN" altLang="en-US" smtClean="0"/>
+              <a:rPr lang="zh-CHS" altLang="en-US" smtClean="0"/>
               <a:pPr/>
               <a:t>‹#›</a:t>
             </a:fld>
-            <a:endParaRPr lang="zh-CN" altLang="en-US"/>
+            <a:endParaRPr lang="zh-CHS" altLang="en-US"/>
           </a:p>
         </p:txBody>
       </p:sp>
@@ -2560,7 +2576,7 @@
           </a:lstStyle>
           <a:p>
             <a:r>
-              <a:rPr kumimoji="0" lang="zh-CN" altLang="en-US" smtClean="0"/>
+              <a:rPr kumimoji="0" lang="zh-CHS" altLang="en-US" smtClean="0"/>
               <a:t>单击此处编辑母版标题样式</a:t>
             </a:r>
             <a:endParaRPr kumimoji="0" lang="en-US"/>
@@ -2610,11 +2626,11 @@
           </a:lstStyle>
           <a:p>
             <a:fld id="{530820CF-B880-4189-942D-D702A7CBA730}" type="datetimeFigureOut">
-              <a:rPr lang="zh-CN" altLang="en-US" smtClean="0"/>
+              <a:rPr lang="zh-CHS" altLang="en-US" smtClean="0"/>
               <a:pPr/>
-              <a:t>2015/3/29</a:t>
+              <a:t>15/3/30</a:t>
             </a:fld>
-            <a:endParaRPr lang="zh-CN" altLang="en-US"/>
+            <a:endParaRPr lang="zh-CHS" altLang="en-US"/>
           </a:p>
         </p:txBody>
       </p:sp>
@@ -2635,7 +2651,7 @@
             <a:extLst/>
           </a:lstStyle>
           <a:p>
-            <a:endParaRPr lang="zh-CN" altLang="en-US"/>
+            <a:endParaRPr lang="zh-CHS" altLang="en-US"/>
           </a:p>
         </p:txBody>
       </p:sp>
@@ -2657,11 +2673,11 @@
           </a:lstStyle>
           <a:p>
             <a:fld id="{0C913308-F349-4B6D-A68A-DD1791B4A57B}" type="slidenum">
-              <a:rPr lang="zh-CN" altLang="en-US" smtClean="0"/>
+              <a:rPr lang="zh-CHS" altLang="en-US" smtClean="0"/>
               <a:pPr/>
               <a:t>‹#›</a:t>
             </a:fld>
-            <a:endParaRPr lang="zh-CN" altLang="en-US"/>
+            <a:endParaRPr lang="zh-CHS" altLang="en-US"/>
           </a:p>
         </p:txBody>
       </p:sp>
@@ -2727,7 +2743,7 @@
           </a:lstStyle>
           <a:p>
             <a:r>
-              <a:rPr kumimoji="0" lang="zh-CN" altLang="en-US" smtClean="0"/>
+              <a:rPr kumimoji="0" lang="zh-CHS" altLang="en-US" smtClean="0"/>
               <a:t>单击此处编辑母版标题样式</a:t>
             </a:r>
             <a:endParaRPr kumimoji="0" lang="en-US"/>
@@ -2778,7 +2794,7 @@
           <a:p>
             <a:pPr lvl="0" eaLnBrk="1" latinLnBrk="0" hangingPunct="1"/>
             <a:r>
-              <a:rPr kumimoji="0" lang="zh-CN" altLang="en-US" smtClean="0"/>
+              <a:rPr kumimoji="0" lang="zh-CHS" altLang="en-US" smtClean="0"/>
               <a:t>单击此处编辑母版文本样式</a:t>
             </a:r>
           </a:p>
@@ -2823,35 +2839,35 @@
           <a:p>
             <a:pPr lvl="0" eaLnBrk="1" latinLnBrk="0" hangingPunct="1"/>
             <a:r>
-              <a:rPr lang="zh-CN" altLang="en-US" smtClean="0"/>
+              <a:rPr lang="zh-CHS" altLang="en-US" smtClean="0"/>
               <a:t>单击此处编辑母版文本样式</a:t>
             </a:r>
           </a:p>
           <a:p>
             <a:pPr lvl="1" eaLnBrk="1" latinLnBrk="0" hangingPunct="1"/>
             <a:r>
-              <a:rPr lang="zh-CN" altLang="en-US" smtClean="0"/>
+              <a:rPr lang="zh-CHS" altLang="en-US" smtClean="0"/>
               <a:t>第二级</a:t>
             </a:r>
           </a:p>
           <a:p>
             <a:pPr lvl="2" eaLnBrk="1" latinLnBrk="0" hangingPunct="1"/>
             <a:r>
-              <a:rPr lang="zh-CN" altLang="en-US" smtClean="0"/>
+              <a:rPr lang="zh-CHS" altLang="en-US" smtClean="0"/>
               <a:t>第三级</a:t>
             </a:r>
           </a:p>
           <a:p>
             <a:pPr lvl="3" eaLnBrk="1" latinLnBrk="0" hangingPunct="1"/>
             <a:r>
-              <a:rPr lang="zh-CN" altLang="en-US" smtClean="0"/>
+              <a:rPr lang="zh-CHS" altLang="en-US" smtClean="0"/>
               <a:t>第四级</a:t>
             </a:r>
           </a:p>
           <a:p>
             <a:pPr lvl="4" eaLnBrk="1" latinLnBrk="0" hangingPunct="1"/>
             <a:r>
-              <a:rPr lang="zh-CN" altLang="en-US" smtClean="0"/>
+              <a:rPr lang="zh-CHS" altLang="en-US" smtClean="0"/>
               <a:t>第五级</a:t>
             </a:r>
             <a:endParaRPr kumimoji="0" lang="en-US"/>
@@ -2881,11 +2897,11 @@
           </a:lstStyle>
           <a:p>
             <a:fld id="{530820CF-B880-4189-942D-D702A7CBA730}" type="datetimeFigureOut">
-              <a:rPr lang="zh-CN" altLang="en-US" smtClean="0"/>
+              <a:rPr lang="zh-CHS" altLang="en-US" smtClean="0"/>
               <a:pPr/>
-              <a:t>2015/3/29</a:t>
+              <a:t>15/3/30</a:t>
             </a:fld>
-            <a:endParaRPr lang="zh-CN" altLang="en-US"/>
+            <a:endParaRPr lang="zh-CHS" altLang="en-US"/>
           </a:p>
         </p:txBody>
       </p:sp>
@@ -2906,7 +2922,7 @@
             <a:extLst/>
           </a:lstStyle>
           <a:p>
-            <a:endParaRPr lang="zh-CN" altLang="en-US"/>
+            <a:endParaRPr lang="zh-CHS" altLang="en-US"/>
           </a:p>
         </p:txBody>
       </p:sp>
@@ -2928,11 +2944,11 @@
           </a:lstStyle>
           <a:p>
             <a:fld id="{0C913308-F349-4B6D-A68A-DD1791B4A57B}" type="slidenum">
-              <a:rPr lang="zh-CN" altLang="en-US" smtClean="0"/>
+              <a:rPr lang="zh-CHS" altLang="en-US" smtClean="0"/>
               <a:pPr/>
               <a:t>‹#›</a:t>
             </a:fld>
-            <a:endParaRPr lang="zh-CN" altLang="en-US"/>
+            <a:endParaRPr lang="zh-CHS" altLang="en-US"/>
           </a:p>
         </p:txBody>
       </p:sp>
@@ -3002,7 +3018,7 @@
           <a:p>
             <a:pPr lvl="0" eaLnBrk="1" latinLnBrk="0" hangingPunct="1"/>
             <a:r>
-              <a:rPr kumimoji="0" lang="zh-CN" altLang="en-US" smtClean="0"/>
+              <a:rPr kumimoji="0" lang="zh-CHS" altLang="en-US" smtClean="0"/>
               <a:t>单击此处编辑母版文本样式</a:t>
             </a:r>
           </a:p>
@@ -3051,7 +3067,7 @@
           </a:lstStyle>
           <a:p>
             <a:r>
-              <a:rPr kumimoji="0" lang="zh-CN" altLang="en-US" smtClean="0"/>
+              <a:rPr kumimoji="0" lang="zh-CHS" altLang="en-US" smtClean="0"/>
               <a:t>单击图标添加图片</a:t>
             </a:r>
             <a:endParaRPr kumimoji="0" lang="en-US" dirty="0"/>
@@ -3083,11 +3099,11 @@
           </a:lstStyle>
           <a:p>
             <a:fld id="{530820CF-B880-4189-942D-D702A7CBA730}" type="datetimeFigureOut">
-              <a:rPr lang="zh-CN" altLang="en-US" smtClean="0"/>
+              <a:rPr lang="zh-CHS" altLang="en-US" smtClean="0"/>
               <a:pPr/>
-              <a:t>2015/3/29</a:t>
+              <a:t>15/3/30</a:t>
             </a:fld>
-            <a:endParaRPr lang="zh-CN" altLang="en-US"/>
+            <a:endParaRPr lang="zh-CHS" altLang="en-US"/>
           </a:p>
         </p:txBody>
       </p:sp>
@@ -3120,7 +3136,7 @@
             <a:extLst/>
           </a:lstStyle>
           <a:p>
-            <a:endParaRPr lang="zh-CN" altLang="en-US"/>
+            <a:endParaRPr lang="zh-CHS" altLang="en-US"/>
           </a:p>
         </p:txBody>
       </p:sp>
@@ -3149,11 +3165,11 @@
           </a:lstStyle>
           <a:p>
             <a:fld id="{0C913308-F349-4B6D-A68A-DD1791B4A57B}" type="slidenum">
-              <a:rPr lang="zh-CN" altLang="en-US" smtClean="0"/>
+              <a:rPr lang="zh-CHS" altLang="en-US" smtClean="0"/>
               <a:pPr/>
               <a:t>‹#›</a:t>
             </a:fld>
-            <a:endParaRPr lang="zh-CN" altLang="en-US"/>
+            <a:endParaRPr lang="zh-CHS" altLang="en-US"/>
           </a:p>
         </p:txBody>
       </p:sp>
@@ -3198,7 +3214,7 @@
           </a:lstStyle>
           <a:p>
             <a:r>
-              <a:rPr kumimoji="0" lang="zh-CN" altLang="en-US" smtClean="0"/>
+              <a:rPr kumimoji="0" lang="zh-CHS" altLang="en-US" smtClean="0"/>
               <a:t>单击此处编辑母版标题样式</a:t>
             </a:r>
             <a:endParaRPr kumimoji="0" lang="en-US"/>
@@ -4099,7 +4115,7 @@
           </a:lstStyle>
           <a:p>
             <a:r>
-              <a:rPr kumimoji="0" lang="zh-CN" altLang="en-US" smtClean="0"/>
+              <a:rPr kumimoji="0" lang="zh-CHS" altLang="en-US" smtClean="0"/>
               <a:t>单击此处编辑母版标题样式</a:t>
             </a:r>
             <a:endParaRPr kumimoji="0" lang="en-US"/>
@@ -4135,35 +4151,35 @@
           <a:p>
             <a:pPr lvl="0" eaLnBrk="1" latinLnBrk="0" hangingPunct="1"/>
             <a:r>
-              <a:rPr kumimoji="0" lang="zh-CN" altLang="en-US" smtClean="0"/>
+              <a:rPr kumimoji="0" lang="zh-CHS" altLang="en-US" smtClean="0"/>
               <a:t>单击此处编辑母版文本样式</a:t>
             </a:r>
           </a:p>
           <a:p>
             <a:pPr lvl="1" eaLnBrk="1" latinLnBrk="0" hangingPunct="1"/>
             <a:r>
-              <a:rPr kumimoji="0" lang="zh-CN" altLang="en-US" smtClean="0"/>
+              <a:rPr kumimoji="0" lang="zh-CHS" altLang="en-US" smtClean="0"/>
               <a:t>第二级</a:t>
             </a:r>
           </a:p>
           <a:p>
             <a:pPr lvl="2" eaLnBrk="1" latinLnBrk="0" hangingPunct="1"/>
             <a:r>
-              <a:rPr kumimoji="0" lang="zh-CN" altLang="en-US" smtClean="0"/>
+              <a:rPr kumimoji="0" lang="zh-CHS" altLang="en-US" smtClean="0"/>
               <a:t>第三级</a:t>
             </a:r>
           </a:p>
           <a:p>
             <a:pPr lvl="3" eaLnBrk="1" latinLnBrk="0" hangingPunct="1"/>
             <a:r>
-              <a:rPr kumimoji="0" lang="zh-CN" altLang="en-US" smtClean="0"/>
+              <a:rPr kumimoji="0" lang="zh-CHS" altLang="en-US" smtClean="0"/>
               <a:t>第四级</a:t>
             </a:r>
           </a:p>
           <a:p>
             <a:pPr lvl="4" eaLnBrk="1" latinLnBrk="0" hangingPunct="1"/>
             <a:r>
-              <a:rPr kumimoji="0" lang="zh-CN" altLang="en-US" smtClean="0"/>
+              <a:rPr kumimoji="0" lang="zh-CHS" altLang="en-US" smtClean="0"/>
               <a:t>第五级</a:t>
             </a:r>
             <a:endParaRPr kumimoji="0" lang="en-US"/>
@@ -4203,11 +4219,11 @@
           </a:lstStyle>
           <a:p>
             <a:fld id="{530820CF-B880-4189-942D-D702A7CBA730}" type="datetimeFigureOut">
-              <a:rPr lang="zh-CN" altLang="en-US" smtClean="0"/>
+              <a:rPr lang="zh-CHS" altLang="en-US" smtClean="0"/>
               <a:pPr/>
-              <a:t>2015/3/29</a:t>
+              <a:t>15/3/30</a:t>
             </a:fld>
-            <a:endParaRPr lang="zh-CN" altLang="en-US"/>
+            <a:endParaRPr lang="zh-CHS" altLang="en-US"/>
           </a:p>
         </p:txBody>
       </p:sp>
@@ -4243,7 +4259,7 @@
             <a:extLst/>
           </a:lstStyle>
           <a:p>
-            <a:endParaRPr lang="zh-CN" altLang="en-US"/>
+            <a:endParaRPr lang="zh-CHS" altLang="en-US"/>
           </a:p>
         </p:txBody>
       </p:sp>
@@ -4280,11 +4296,11 @@
           </a:lstStyle>
           <a:p>
             <a:fld id="{0C913308-F349-4B6D-A68A-DD1791B4A57B}" type="slidenum">
-              <a:rPr lang="zh-CN" altLang="en-US" smtClean="0"/>
+              <a:rPr lang="zh-CHS" altLang="en-US" smtClean="0"/>
               <a:pPr/>
               <a:t>‹#›</a:t>
             </a:fld>
-            <a:endParaRPr lang="zh-CN" altLang="en-US"/>
+            <a:endParaRPr lang="zh-CHS" altLang="en-US"/>
           </a:p>
         </p:txBody>
       </p:sp>
@@ -4634,10 +4650,10 @@
           <a:lstStyle/>
           <a:p>
             <a:r>
-              <a:rPr lang="en-US" altLang="zh-CN" dirty="0" smtClean="0"/>
+              <a:rPr lang="en-US" altLang="zh-CHS" dirty="0" smtClean="0"/>
               <a:t>OpenGL Programming</a:t>
             </a:r>
-            <a:endParaRPr lang="zh-CN" altLang="en-US" dirty="0"/>
+            <a:endParaRPr lang="zh-CHS" altLang="en-US" dirty="0"/>
           </a:p>
         </p:txBody>
       </p:sp>
@@ -4664,35 +4680,35 @@
           <a:lstStyle/>
           <a:p>
             <a:r>
-              <a:rPr lang="en-US" altLang="zh-CN" dirty="0" err="1" smtClean="0"/>
+              <a:rPr lang="en-US" altLang="zh-CHS" dirty="0" err="1" smtClean="0"/>
               <a:t>Chunxu</a:t>
             </a:r>
             <a:r>
-              <a:rPr lang="en-US" altLang="zh-CN" dirty="0" smtClean="0"/>
+              <a:rPr lang="en-US" altLang="zh-CHS" dirty="0" smtClean="0"/>
               <a:t> </a:t>
             </a:r>
             <a:r>
-              <a:rPr lang="en-US" altLang="zh-CN" dirty="0" err="1" smtClean="0"/>
+              <a:rPr lang="en-US" altLang="zh-CHS" dirty="0" err="1" smtClean="0"/>
               <a:t>Xu</a:t>
             </a:r>
-            <a:endParaRPr lang="en-US" altLang="zh-CN" dirty="0" smtClean="0"/>
-          </a:p>
-          <a:p>
-            <a:r>
-              <a:rPr lang="en-US" altLang="zh-CN" dirty="0" smtClean="0"/>
+            <a:endParaRPr lang="en-US" altLang="zh-CHS" dirty="0" smtClean="0"/>
+          </a:p>
+          <a:p>
+            <a:r>
+              <a:rPr lang="en-US" altLang="zh-CHS" dirty="0" smtClean="0"/>
               <a:t>E-mail: xu-cx12@mails.tsinghua.edu.cn</a:t>
             </a:r>
           </a:p>
           <a:p>
             <a:r>
-              <a:rPr lang="en-US" altLang="zh-CN" dirty="0" err="1" smtClean="0"/>
+              <a:rPr lang="en-US" altLang="zh-CHS" dirty="0" err="1" smtClean="0"/>
               <a:t>Cellphone</a:t>
             </a:r>
             <a:r>
-              <a:rPr lang="en-US" altLang="zh-CN" dirty="0" smtClean="0"/>
+              <a:rPr lang="en-US" altLang="zh-CHS" dirty="0" smtClean="0"/>
               <a:t>: 15120003845</a:t>
             </a:r>
-            <a:endParaRPr lang="zh-CN" altLang="en-US" dirty="0"/>
+            <a:endParaRPr lang="zh-CHS" altLang="en-US" dirty="0"/>
           </a:p>
         </p:txBody>
       </p:sp>
@@ -4744,21 +4760,21 @@
           <a:lstStyle/>
           <a:p>
             <a:r>
-              <a:rPr lang="en-US" altLang="zh-CN" dirty="0" smtClean="0"/>
+              <a:rPr lang="en-US" altLang="zh-CHS" dirty="0" smtClean="0"/>
               <a:t>Texture in OpenGL</a:t>
             </a:r>
           </a:p>
           <a:p>
             <a:pPr lvl="1"/>
             <a:r>
-              <a:rPr lang="en-US" altLang="zh-CN" dirty="0" smtClean="0"/>
+              <a:rPr lang="en-US" altLang="zh-CHS" dirty="0" smtClean="0"/>
               <a:t>Set Texture Parameters</a:t>
             </a:r>
           </a:p>
           <a:p>
             <a:pPr lvl="2"/>
             <a:r>
-              <a:rPr lang="en-US" altLang="zh-CN" dirty="0" smtClean="0"/>
+              <a:rPr lang="en-US" altLang="zh-CHS" dirty="0" smtClean="0"/>
               <a:t>Mipmap</a:t>
             </a:r>
           </a:p>
@@ -4767,38 +4783,38 @@
               <a:buNone/>
             </a:pPr>
             <a:r>
-              <a:rPr lang="en-US" altLang="zh-CN" dirty="0" smtClean="0"/>
+              <a:rPr lang="en-US" altLang="zh-CHS" dirty="0" smtClean="0"/>
               <a:t>	</a:t>
             </a:r>
             <a:r>
-              <a:rPr lang="en-US" altLang="zh-CN" dirty="0" smtClean="0">
+              <a:rPr lang="en-US" altLang="zh-CHS" dirty="0" smtClean="0">
                 <a:hlinkClick r:id="rId2" action="ppaction://hlinkfile"/>
               </a:rPr>
               <a:t>Why we need mipmap?</a:t>
             </a:r>
-            <a:endParaRPr lang="en-US" altLang="zh-CN" dirty="0" smtClean="0"/>
+            <a:endParaRPr lang="en-US" altLang="zh-CHS" dirty="0" smtClean="0"/>
           </a:p>
           <a:p>
             <a:pPr lvl="2"/>
-            <a:endParaRPr lang="en-US" altLang="zh-CN" dirty="0" smtClean="0"/>
+            <a:endParaRPr lang="en-US" altLang="zh-CHS" dirty="0" smtClean="0"/>
           </a:p>
           <a:p>
             <a:pPr lvl="2"/>
             <a:r>
-              <a:rPr lang="en-US" altLang="zh-CN" dirty="0" smtClean="0"/>
+              <a:rPr lang="en-US" altLang="zh-CHS" dirty="0" smtClean="0"/>
               <a:t>Basic idea</a:t>
             </a:r>
           </a:p>
           <a:p>
             <a:pPr lvl="3"/>
             <a:r>
-              <a:rPr lang="en-US" altLang="zh-CN" dirty="0" smtClean="0"/>
+              <a:rPr lang="en-US" altLang="zh-CHS" dirty="0" smtClean="0"/>
               <a:t>Store different resolutions of textures</a:t>
             </a:r>
           </a:p>
           <a:p>
             <a:pPr lvl="4"/>
-            <a:endParaRPr lang="en-US" altLang="zh-CN" dirty="0" smtClean="0"/>
+            <a:endParaRPr lang="en-US" altLang="zh-CHS" dirty="0" smtClean="0"/>
           </a:p>
         </p:txBody>
       </p:sp>
@@ -4820,10 +4836,10 @@
           <a:lstStyle/>
           <a:p>
             <a:r>
-              <a:rPr lang="en-US" altLang="zh-CN" sz="3600" dirty="0" smtClean="0"/>
+              <a:rPr lang="en-US" altLang="zh-CHS" sz="3600" dirty="0" smtClean="0"/>
               <a:t>Main techniques we need</a:t>
             </a:r>
-            <a:endParaRPr lang="zh-CN" altLang="en-US" sz="3600" dirty="0"/>
+            <a:endParaRPr lang="zh-CHS" altLang="en-US" sz="3600" dirty="0"/>
           </a:p>
         </p:txBody>
       </p:sp>
@@ -4875,68 +4891,68 @@
           <a:lstStyle/>
           <a:p>
             <a:r>
-              <a:rPr lang="en-US" altLang="zh-CN" dirty="0" smtClean="0"/>
+              <a:rPr lang="en-US" altLang="zh-CHS" dirty="0" smtClean="0"/>
               <a:t>Texture in OpenGL</a:t>
             </a:r>
           </a:p>
           <a:p>
             <a:pPr lvl="1"/>
             <a:r>
-              <a:rPr lang="en-US" altLang="zh-CN" dirty="0" smtClean="0"/>
+              <a:rPr lang="en-US" altLang="zh-CHS" dirty="0" smtClean="0"/>
               <a:t>Set Texture Parameters</a:t>
             </a:r>
           </a:p>
           <a:p>
             <a:pPr lvl="2"/>
             <a:r>
-              <a:rPr lang="en-US" altLang="zh-CN" dirty="0" smtClean="0"/>
+              <a:rPr lang="en-US" altLang="zh-CHS" dirty="0" smtClean="0"/>
               <a:t>Mipmap</a:t>
             </a:r>
           </a:p>
           <a:p>
             <a:pPr lvl="2"/>
-            <a:endParaRPr lang="en-US" altLang="zh-CN" dirty="0" smtClean="0"/>
+            <a:endParaRPr lang="en-US" altLang="zh-CHS" dirty="0" smtClean="0"/>
           </a:p>
           <a:p>
             <a:pPr lvl="2"/>
             <a:r>
-              <a:rPr lang="en-US" altLang="zh-CN" dirty="0" smtClean="0"/>
+              <a:rPr lang="en-US" altLang="zh-CHS" dirty="0" smtClean="0"/>
               <a:t>Come back to the </a:t>
             </a:r>
             <a:r>
-              <a:rPr lang="en-US" altLang="zh-CN" i="1" dirty="0" smtClean="0"/>
+              <a:rPr lang="en-US" altLang="zh-CHS" i="1" dirty="0" smtClean="0"/>
               <a:t>level</a:t>
             </a:r>
             <a:r>
-              <a:rPr lang="en-US" altLang="zh-CN" dirty="0" smtClean="0"/>
+              <a:rPr lang="en-US" altLang="zh-CHS" dirty="0" smtClean="0"/>
               <a:t> parameter of glTexImage2D()</a:t>
             </a:r>
           </a:p>
           <a:p>
             <a:pPr lvl="3"/>
             <a:r>
-              <a:rPr lang="en-US" altLang="zh-CN" dirty="0" smtClean="0"/>
+              <a:rPr lang="en-US" altLang="zh-CHS" dirty="0" smtClean="0"/>
               <a:t>We can use different glTexImage2D() calls with different </a:t>
             </a:r>
             <a:r>
-              <a:rPr lang="en-US" altLang="zh-CN" i="1" dirty="0" smtClean="0"/>
+              <a:rPr lang="en-US" altLang="zh-CHS" i="1" dirty="0" smtClean="0"/>
               <a:t>level</a:t>
             </a:r>
             <a:r>
-              <a:rPr lang="en-US" altLang="zh-CN" dirty="0" smtClean="0"/>
+              <a:rPr lang="en-US" altLang="zh-CHS" dirty="0" smtClean="0"/>
               <a:t> parameter</a:t>
             </a:r>
           </a:p>
           <a:p>
             <a:pPr lvl="3"/>
-            <a:endParaRPr lang="en-US" altLang="zh-CN" dirty="0" smtClean="0"/>
+            <a:endParaRPr lang="en-US" altLang="zh-CHS" dirty="0" smtClean="0"/>
           </a:p>
           <a:p>
             <a:pPr lvl="3">
               <a:buNone/>
             </a:pPr>
             <a:r>
-              <a:rPr lang="en-US" altLang="zh-CN" dirty="0" smtClean="0"/>
+              <a:rPr lang="en-US" altLang="zh-CHS" dirty="0" smtClean="0"/>
               <a:t>	glTexImage2D(…, 0, …)</a:t>
             </a:r>
           </a:p>
@@ -4945,7 +4961,7 @@
               <a:buNone/>
             </a:pPr>
             <a:r>
-              <a:rPr lang="en-US" altLang="zh-CN" dirty="0" smtClean="0"/>
+              <a:rPr lang="en-US" altLang="zh-CHS" dirty="0" smtClean="0"/>
               <a:t>	glTexImage2D(…, 1, …)</a:t>
             </a:r>
           </a:p>
@@ -4954,7 +4970,7 @@
               <a:buNone/>
             </a:pPr>
             <a:r>
-              <a:rPr lang="en-US" altLang="zh-CN" dirty="0" smtClean="0"/>
+              <a:rPr lang="en-US" altLang="zh-CHS" dirty="0" smtClean="0"/>
               <a:t>	glTexImage2D(…, 2, …)</a:t>
             </a:r>
           </a:p>
@@ -4978,10 +4994,10 @@
           <a:lstStyle/>
           <a:p>
             <a:r>
-              <a:rPr lang="en-US" altLang="zh-CN" sz="3600" dirty="0" smtClean="0"/>
+              <a:rPr lang="en-US" altLang="zh-CHS" sz="3600" dirty="0" smtClean="0"/>
               <a:t>Main techniques we need</a:t>
             </a:r>
-            <a:endParaRPr lang="zh-CN" altLang="en-US" sz="3600" dirty="0"/>
+            <a:endParaRPr lang="zh-CHS" altLang="en-US" sz="3600" dirty="0"/>
           </a:p>
         </p:txBody>
       </p:sp>
@@ -5033,168 +5049,167 @@
           <a:lstStyle/>
           <a:p>
             <a:r>
-              <a:rPr lang="en-US" altLang="zh-CN" dirty="0" smtClean="0"/>
+              <a:rPr lang="en-US" altLang="zh-CHS" dirty="0" smtClean="0"/>
               <a:t>Texture in OpenGL</a:t>
             </a:r>
           </a:p>
           <a:p>
             <a:pPr lvl="1"/>
             <a:r>
-              <a:rPr lang="en-US" altLang="zh-CN" dirty="0" smtClean="0"/>
+              <a:rPr lang="en-US" altLang="zh-CHS" dirty="0" smtClean="0"/>
               <a:t>Set Texture Parameters</a:t>
             </a:r>
           </a:p>
           <a:p>
             <a:pPr lvl="2"/>
             <a:r>
-              <a:rPr lang="en-US" altLang="zh-CN" dirty="0" smtClean="0"/>
+              <a:rPr lang="en-US" altLang="zh-CHS" dirty="0" smtClean="0"/>
               <a:t>Mipmap</a:t>
             </a:r>
           </a:p>
           <a:p>
             <a:pPr lvl="2"/>
-            <a:endParaRPr lang="en-US" altLang="zh-CN" dirty="0" smtClean="0"/>
+            <a:endParaRPr lang="en-US" altLang="zh-CHS" dirty="0" smtClean="0"/>
           </a:p>
           <a:p>
             <a:pPr lvl="2"/>
             <a:r>
-              <a:rPr lang="en-US" altLang="zh-CN" dirty="0" smtClean="0"/>
+              <a:rPr lang="en-US" altLang="zh-CHS" dirty="0" smtClean="0"/>
               <a:t>A much more easier way to read for </a:t>
             </a:r>
             <a:r>
-              <a:rPr lang="en-US" altLang="zh-CN" dirty="0" err="1" smtClean="0"/>
+              <a:rPr lang="en-US" altLang="zh-CHS" dirty="0" err="1" smtClean="0"/>
               <a:t>mipmap</a:t>
             </a:r>
             <a:r>
-              <a:rPr lang="en-US" altLang="zh-CN" dirty="0" smtClean="0"/>
+              <a:rPr lang="en-US" altLang="zh-CHS" dirty="0" smtClean="0"/>
               <a:t> filtering</a:t>
             </a:r>
           </a:p>
           <a:p>
             <a:pPr lvl="2"/>
-            <a:endParaRPr lang="en-US" altLang="zh-CN" dirty="0" smtClean="0"/>
+            <a:endParaRPr lang="en-US" altLang="zh-CHS" dirty="0" smtClean="0"/>
           </a:p>
           <a:p>
             <a:pPr lvl="2">
               <a:buNone/>
             </a:pPr>
             <a:r>
-              <a:rPr lang="en-US" altLang="zh-CN" b="1" dirty="0" smtClean="0"/>
+              <a:rPr lang="en-US" altLang="zh-CHS" b="1" dirty="0" smtClean="0"/>
               <a:t>	</a:t>
             </a:r>
             <a:r>
-              <a:rPr lang="en-US" altLang="zh-CN" b="1" dirty="0" err="1" smtClean="0"/>
+              <a:rPr lang="en-US" altLang="zh-CHS" b="1" dirty="0" err="1" smtClean="0"/>
               <a:t>int</a:t>
             </a:r>
             <a:r>
-              <a:rPr lang="en-US" altLang="zh-CN" b="1" dirty="0" smtClean="0"/>
+              <a:rPr lang="en-US" altLang="zh-CHS" b="1" dirty="0" smtClean="0"/>
               <a:t> gluBuild2DMipmaps(</a:t>
             </a:r>
             <a:r>
-              <a:rPr lang="en-US" altLang="zh-CN" b="1" dirty="0" err="1" smtClean="0"/>
+              <a:rPr lang="en-US" altLang="zh-CHS" b="1" dirty="0" err="1" smtClean="0"/>
               <a:t>GLenum</a:t>
             </a:r>
             <a:r>
-              <a:rPr lang="en-US" altLang="zh-CN" b="1" dirty="0" smtClean="0"/>
+              <a:rPr lang="en-US" altLang="zh-CHS" b="1" dirty="0" smtClean="0"/>
               <a:t> </a:t>
             </a:r>
             <a:r>
-              <a:rPr lang="en-US" altLang="zh-CN" b="1" i="1" dirty="0" smtClean="0"/>
+              <a:rPr lang="en-US" altLang="zh-CHS" b="1" i="1" dirty="0" smtClean="0"/>
               <a:t>target</a:t>
             </a:r>
             <a:r>
-              <a:rPr lang="en-US" altLang="zh-CN" b="1" dirty="0" smtClean="0"/>
+              <a:rPr lang="en-US" altLang="zh-CHS" b="1" dirty="0" smtClean="0"/>
               <a:t>, </a:t>
             </a:r>
             <a:r>
-              <a:rPr lang="en-US" altLang="zh-CN" b="1" dirty="0" err="1" smtClean="0"/>
+              <a:rPr lang="en-US" altLang="zh-CHS" b="1" dirty="0" err="1" smtClean="0"/>
               <a:t>GLint</a:t>
             </a:r>
             <a:r>
-              <a:rPr lang="en-US" altLang="zh-CN" b="1" dirty="0" smtClean="0"/>
+              <a:rPr lang="en-US" altLang="zh-CHS" b="1" dirty="0" smtClean="0"/>
               <a:t> </a:t>
             </a:r>
             <a:r>
-              <a:rPr lang="en-US" altLang="zh-CN" b="1" i="1" dirty="0" err="1" smtClean="0"/>
+              <a:rPr lang="en-US" altLang="zh-CHS" b="1" i="1" dirty="0" err="1" smtClean="0"/>
               <a:t>internalFormat</a:t>
             </a:r>
             <a:r>
-              <a:rPr lang="en-US" altLang="zh-CN" b="1" dirty="0" smtClean="0"/>
+              <a:rPr lang="en-US" altLang="zh-CHS" b="1" dirty="0" smtClean="0"/>
               <a:t>, </a:t>
             </a:r>
             <a:r>
-              <a:rPr lang="en-US" altLang="zh-CN" b="1" dirty="0" err="1" smtClean="0"/>
+              <a:rPr lang="en-US" altLang="zh-CHS" b="1" dirty="0" err="1" smtClean="0"/>
               <a:t>GLint</a:t>
             </a:r>
             <a:r>
-              <a:rPr lang="en-US" altLang="zh-CN" b="1" dirty="0" smtClean="0"/>
+              <a:rPr lang="en-US" altLang="zh-CHS" b="1" dirty="0" smtClean="0"/>
               <a:t> </a:t>
             </a:r>
             <a:r>
-              <a:rPr lang="en-US" altLang="zh-CN" b="1" i="1" dirty="0" smtClean="0"/>
+              <a:rPr lang="en-US" altLang="zh-CHS" b="1" i="1" dirty="0" smtClean="0"/>
               <a:t>width</a:t>
             </a:r>
             <a:r>
-              <a:rPr lang="en-US" altLang="zh-CN" b="1" dirty="0" smtClean="0"/>
+              <a:rPr lang="en-US" altLang="zh-CHS" b="1" dirty="0" smtClean="0"/>
               <a:t>, </a:t>
             </a:r>
             <a:r>
-              <a:rPr lang="en-US" altLang="zh-CN" b="1" dirty="0" err="1" smtClean="0"/>
+              <a:rPr lang="en-US" altLang="zh-CHS" b="1" dirty="0" err="1" smtClean="0"/>
               <a:t>GLint</a:t>
             </a:r>
             <a:r>
-              <a:rPr lang="en-US" altLang="zh-CN" b="1" dirty="0" smtClean="0"/>
+              <a:rPr lang="en-US" altLang="zh-CHS" b="1" dirty="0" smtClean="0"/>
               <a:t> </a:t>
             </a:r>
             <a:r>
-              <a:rPr lang="en-US" altLang="zh-CN" b="1" i="1" dirty="0" smtClean="0"/>
+              <a:rPr lang="en-US" altLang="zh-CHS" b="1" i="1" dirty="0" smtClean="0"/>
               <a:t>height</a:t>
             </a:r>
             <a:r>
-              <a:rPr lang="en-US" altLang="zh-CN" b="1" dirty="0" smtClean="0"/>
+              <a:rPr lang="en-US" altLang="zh-CHS" b="1" dirty="0" smtClean="0"/>
               <a:t>, </a:t>
             </a:r>
             <a:r>
-              <a:rPr lang="en-US" altLang="zh-CN" b="1" dirty="0" err="1" smtClean="0"/>
+              <a:rPr lang="en-US" altLang="zh-CHS" b="1" dirty="0" err="1" smtClean="0"/>
               <a:t>GLenum</a:t>
             </a:r>
             <a:r>
-              <a:rPr lang="en-US" altLang="zh-CN" b="1" dirty="0" smtClean="0"/>
+              <a:rPr lang="en-US" altLang="zh-CHS" b="1" dirty="0" smtClean="0"/>
               <a:t> </a:t>
             </a:r>
             <a:r>
-              <a:rPr lang="en-US" altLang="zh-CN" b="1" i="1" dirty="0" smtClean="0"/>
+              <a:rPr lang="en-US" altLang="zh-CHS" b="1" i="1" dirty="0" smtClean="0"/>
               <a:t>format</a:t>
             </a:r>
             <a:r>
-              <a:rPr lang="en-US" altLang="zh-CN" b="1" dirty="0" smtClean="0"/>
+              <a:rPr lang="en-US" altLang="zh-CHS" b="1" dirty="0" smtClean="0"/>
               <a:t>, </a:t>
             </a:r>
             <a:r>
-              <a:rPr lang="en-US" altLang="zh-CN" b="1" dirty="0" err="1" smtClean="0"/>
+              <a:rPr lang="en-US" altLang="zh-CHS" b="1" dirty="0" err="1" smtClean="0"/>
               <a:t>GLenum</a:t>
             </a:r>
             <a:r>
-              <a:rPr lang="en-US" altLang="zh-CN" b="1" dirty="0" smtClean="0"/>
+              <a:rPr lang="en-US" altLang="zh-CHS" b="1" dirty="0" smtClean="0"/>
               <a:t> </a:t>
             </a:r>
             <a:r>
-              <a:rPr lang="en-US" altLang="zh-CN" b="1" i="1" dirty="0" smtClean="0"/>
+              <a:rPr lang="en-US" altLang="zh-CHS" b="1" i="1" dirty="0" smtClean="0"/>
               <a:t>type</a:t>
             </a:r>
             <a:r>
-              <a:rPr lang="en-US" altLang="zh-CN" b="1" dirty="0" smtClean="0"/>
+              <a:rPr lang="en-US" altLang="zh-CHS" b="1" dirty="0" smtClean="0"/>
               <a:t>, const void* </a:t>
             </a:r>
             <a:r>
-              <a:rPr lang="en-US" altLang="zh-CN" b="1" i="1" dirty="0" smtClean="0"/>
+              <a:rPr lang="en-US" altLang="zh-CHS" b="1" i="1" dirty="0" smtClean="0"/>
               <a:t>data</a:t>
             </a:r>
             <a:r>
-              <a:rPr lang="en-US" altLang="zh-CN" b="1" dirty="0" smtClean="0"/>
+              <a:rPr lang="en-US" altLang="zh-CHS" b="1" dirty="0" smtClean="0"/>
               <a:t>)</a:t>
             </a:r>
-            <a:endParaRPr lang="en-US" altLang="zh-CN" b="1" dirty="0" smtClean="0"/>
           </a:p>
         </p:txBody>
       </p:sp>
@@ -5216,10 +5231,10 @@
           <a:lstStyle/>
           <a:p>
             <a:r>
-              <a:rPr lang="en-US" altLang="zh-CN" sz="3600" dirty="0" smtClean="0"/>
+              <a:rPr lang="en-US" altLang="zh-CHS" sz="3600" dirty="0" smtClean="0"/>
               <a:t>Main techniques we need</a:t>
             </a:r>
-            <a:endParaRPr lang="zh-CN" altLang="en-US" sz="3600" dirty="0"/>
+            <a:endParaRPr lang="zh-CHS" altLang="en-US" sz="3600" dirty="0"/>
           </a:p>
         </p:txBody>
       </p:sp>
@@ -5271,82 +5286,82 @@
           <a:lstStyle/>
           <a:p>
             <a:r>
-              <a:rPr lang="en-US" altLang="zh-CN" dirty="0" smtClean="0"/>
+              <a:rPr lang="en-US" altLang="zh-CHS" dirty="0" smtClean="0"/>
               <a:t>Texture in OpenGL</a:t>
             </a:r>
           </a:p>
           <a:p>
             <a:pPr lvl="1"/>
             <a:r>
-              <a:rPr lang="en-US" altLang="zh-CN" dirty="0" smtClean="0"/>
+              <a:rPr lang="en-US" altLang="zh-CHS" dirty="0" smtClean="0"/>
               <a:t>Set Texture Parameters</a:t>
             </a:r>
           </a:p>
           <a:p>
             <a:pPr lvl="2"/>
             <a:r>
-              <a:rPr lang="en-US" altLang="zh-CN" dirty="0" smtClean="0"/>
+              <a:rPr lang="en-US" altLang="zh-CHS" dirty="0" smtClean="0"/>
               <a:t>Wrapping</a:t>
             </a:r>
           </a:p>
           <a:p>
             <a:pPr lvl="3"/>
             <a:r>
-              <a:rPr lang="en-US" altLang="zh-CN" dirty="0" smtClean="0"/>
+              <a:rPr lang="en-US" altLang="zh-CHS" dirty="0" smtClean="0"/>
               <a:t>Texture coordinate</a:t>
             </a:r>
           </a:p>
           <a:p>
             <a:pPr lvl="4"/>
             <a:r>
-              <a:rPr lang="en-US" altLang="zh-CN" dirty="0" smtClean="0"/>
+              <a:rPr lang="en-US" altLang="zh-CHS" dirty="0" smtClean="0"/>
               <a:t>ranges in [0.0, 1.0]</a:t>
             </a:r>
           </a:p>
           <a:p>
             <a:pPr lvl="4"/>
-            <a:endParaRPr lang="en-US" altLang="zh-CN" dirty="0" smtClean="0"/>
+            <a:endParaRPr lang="en-US" altLang="zh-CHS" dirty="0" smtClean="0"/>
           </a:p>
           <a:p>
             <a:pPr lvl="3"/>
             <a:r>
-              <a:rPr lang="en-US" altLang="zh-CN" dirty="0" smtClean="0"/>
+              <a:rPr lang="en-US" altLang="zh-CHS" dirty="0" smtClean="0"/>
               <a:t>What if it is out of bounder?</a:t>
             </a:r>
           </a:p>
           <a:p>
             <a:pPr lvl="4"/>
             <a:r>
-              <a:rPr lang="en-US" altLang="zh-CN" dirty="0" err="1" smtClean="0"/>
+              <a:rPr lang="en-US" altLang="zh-CHS" dirty="0" err="1" smtClean="0"/>
               <a:t>pname</a:t>
             </a:r>
-            <a:endParaRPr lang="en-US" altLang="zh-CN" dirty="0" smtClean="0"/>
+            <a:endParaRPr lang="en-US" altLang="zh-CHS" dirty="0" smtClean="0"/>
           </a:p>
           <a:p>
             <a:pPr lvl="5"/>
             <a:r>
-              <a:rPr lang="en-US" altLang="zh-CN" dirty="0" smtClean="0"/>
+              <a:rPr lang="en-US" altLang="zh-CHS" dirty="0" smtClean="0"/>
               <a:t>GL_TEXTURE_WRAP_S</a:t>
             </a:r>
           </a:p>
           <a:p>
             <a:pPr lvl="5"/>
             <a:r>
-              <a:rPr lang="en-US" altLang="zh-CN" dirty="0" smtClean="0"/>
+              <a:rPr lang="en-US" altLang="zh-CHS" dirty="0" smtClean="0"/>
               <a:t>GL_TEXTURE_WRAP_T</a:t>
             </a:r>
           </a:p>
           <a:p>
             <a:pPr lvl="5"/>
             <a:r>
-              <a:rPr lang="en-US" altLang="zh-CN" dirty="0" smtClean="0"/>
+              <a:rPr lang="en-US" altLang="zh-CHS" dirty="0" smtClean="0"/>
               <a:t>GL_TEXTURE_WRAP_R</a:t>
             </a:r>
           </a:p>
           <a:p>
             <a:pPr lvl="5"/>
             <a:r>
-              <a:rPr lang="en-US" altLang="zh-CN" dirty="0" smtClean="0"/>
+              <a:rPr lang="en-US" altLang="zh-CHS" dirty="0" smtClean="0"/>
               <a:t>…</a:t>
             </a:r>
           </a:p>
@@ -5354,7 +5369,7 @@
             <a:pPr lvl="4">
               <a:buNone/>
             </a:pPr>
-            <a:endParaRPr lang="en-US" altLang="zh-CN" dirty="0" smtClean="0"/>
+            <a:endParaRPr lang="en-US" altLang="zh-CHS" dirty="0" smtClean="0"/>
           </a:p>
         </p:txBody>
       </p:sp>
@@ -5376,10 +5391,10 @@
           <a:lstStyle/>
           <a:p>
             <a:r>
-              <a:rPr lang="en-US" altLang="zh-CN" sz="3600" dirty="0" smtClean="0"/>
+              <a:rPr lang="en-US" altLang="zh-CHS" sz="3600" dirty="0" smtClean="0"/>
               <a:t>Main techniques we need</a:t>
             </a:r>
-            <a:endParaRPr lang="zh-CN" altLang="en-US" sz="3600" dirty="0"/>
+            <a:endParaRPr lang="zh-CHS" altLang="en-US" sz="3600" dirty="0"/>
           </a:p>
         </p:txBody>
       </p:sp>
@@ -5433,19 +5448,19 @@
           <a:lstStyle/>
           <a:p>
             <a:r>
-              <a:rPr lang="en-US" altLang="zh-CN" dirty="0" smtClean="0"/>
+              <a:rPr lang="en-US" altLang="zh-CHS" dirty="0" smtClean="0"/>
               <a:t>Texture in OpenGL</a:t>
             </a:r>
           </a:p>
           <a:p>
             <a:pPr lvl="1"/>
             <a:r>
-              <a:rPr lang="en-US" altLang="zh-CN" dirty="0" smtClean="0"/>
+              <a:rPr lang="en-US" altLang="zh-CHS" dirty="0" smtClean="0"/>
               <a:t>Set Texture Parameters</a:t>
             </a:r>
           </a:p>
           <a:p>
-            <a:endParaRPr lang="en-US" altLang="zh-CN" dirty="0" smtClean="0"/>
+            <a:endParaRPr lang="en-US" altLang="zh-CHS" dirty="0" smtClean="0"/>
           </a:p>
         </p:txBody>
       </p:sp>
@@ -5467,10 +5482,10 @@
           <a:lstStyle/>
           <a:p>
             <a:r>
-              <a:rPr lang="en-US" altLang="zh-CN" sz="3600" dirty="0" smtClean="0"/>
+              <a:rPr lang="en-US" altLang="zh-CHS" sz="3600" dirty="0" smtClean="0"/>
               <a:t>Main techniques we need</a:t>
             </a:r>
-            <a:endParaRPr lang="zh-CN" altLang="en-US" sz="3600" dirty="0"/>
+            <a:endParaRPr lang="zh-CHS" altLang="en-US" sz="3600" dirty="0"/>
           </a:p>
         </p:txBody>
       </p:sp>
@@ -5510,7 +5525,7 @@
           <a:lstStyle/>
           <a:p>
             <a:pPr algn="ctr"/>
-            <a:endParaRPr lang="zh-CN" altLang="en-US"/>
+            <a:endParaRPr lang="zh-CHS" altLang="en-US"/>
           </a:p>
         </p:txBody>
       </p:sp>
@@ -5575,10 +5590,10 @@
             <a:lstStyle/>
             <a:p>
               <a:r>
-                <a:rPr lang="en-US" altLang="zh-CN" dirty="0" smtClean="0"/>
+                <a:rPr lang="en-US" altLang="zh-CHS" dirty="0" smtClean="0"/>
                 <a:t>(0.0, 0.0)</a:t>
               </a:r>
-              <a:endParaRPr lang="zh-CN" altLang="en-US" dirty="0"/>
+              <a:endParaRPr lang="zh-CHS" altLang="en-US" dirty="0"/>
             </a:p>
           </p:txBody>
         </p:sp>
@@ -5605,10 +5620,10 @@
             <a:lstStyle/>
             <a:p>
               <a:r>
-                <a:rPr lang="en-US" altLang="zh-CN" dirty="0" smtClean="0"/>
+                <a:rPr lang="en-US" altLang="zh-CHS" dirty="0" smtClean="0"/>
                 <a:t>(0.0, 1.0)</a:t>
               </a:r>
-              <a:endParaRPr lang="zh-CN" altLang="en-US" dirty="0"/>
+              <a:endParaRPr lang="zh-CHS" altLang="en-US" dirty="0"/>
             </a:p>
           </p:txBody>
         </p:sp>
@@ -5635,10 +5650,10 @@
             <a:lstStyle/>
             <a:p>
               <a:r>
-                <a:rPr lang="en-US" altLang="zh-CN" dirty="0" smtClean="0"/>
+                <a:rPr lang="en-US" altLang="zh-CHS" dirty="0" smtClean="0"/>
                 <a:t>(1.0, 1.0)</a:t>
               </a:r>
-              <a:endParaRPr lang="zh-CN" altLang="en-US" dirty="0"/>
+              <a:endParaRPr lang="zh-CHS" altLang="en-US" dirty="0"/>
             </a:p>
           </p:txBody>
         </p:sp>
@@ -5665,10 +5680,10 @@
             <a:lstStyle/>
             <a:p>
               <a:r>
-                <a:rPr lang="en-US" altLang="zh-CN" dirty="0" smtClean="0"/>
+                <a:rPr lang="en-US" altLang="zh-CHS" dirty="0" smtClean="0"/>
                 <a:t>(0.0, 1.0)</a:t>
               </a:r>
-              <a:endParaRPr lang="zh-CN" altLang="en-US" dirty="0"/>
+              <a:endParaRPr lang="zh-CHS" altLang="en-US" dirty="0"/>
             </a:p>
           </p:txBody>
         </p:sp>
@@ -5946,57 +5961,57 @@
           <a:lstStyle/>
           <a:p>
             <a:r>
-              <a:rPr lang="en-US" altLang="zh-CN" dirty="0" smtClean="0"/>
+              <a:rPr lang="en-US" altLang="zh-CHS" dirty="0" smtClean="0"/>
               <a:t>Texture in OpenGL</a:t>
             </a:r>
           </a:p>
           <a:p>
             <a:pPr lvl="1"/>
             <a:r>
-              <a:rPr lang="en-US" altLang="zh-CN" dirty="0" smtClean="0"/>
+              <a:rPr lang="en-US" altLang="zh-CHS" dirty="0" smtClean="0"/>
               <a:t>Set Texture Parameters</a:t>
             </a:r>
           </a:p>
           <a:p>
             <a:pPr lvl="2"/>
             <a:r>
-              <a:rPr lang="en-US" altLang="zh-CN" dirty="0" smtClean="0"/>
+              <a:rPr lang="en-US" altLang="zh-CHS" dirty="0" smtClean="0"/>
               <a:t>Wrapping</a:t>
             </a:r>
           </a:p>
           <a:p>
             <a:pPr lvl="3"/>
             <a:r>
-              <a:rPr lang="en-US" altLang="zh-CN" dirty="0" err="1" smtClean="0"/>
+              <a:rPr lang="en-US" altLang="zh-CHS" dirty="0" err="1" smtClean="0"/>
               <a:t>param</a:t>
             </a:r>
-            <a:endParaRPr lang="en-US" altLang="zh-CN" dirty="0" smtClean="0"/>
+            <a:endParaRPr lang="en-US" altLang="zh-CHS" dirty="0" smtClean="0"/>
           </a:p>
           <a:p>
             <a:pPr lvl="4"/>
             <a:r>
-              <a:rPr lang="en-US" altLang="zh-CN" dirty="0" smtClean="0"/>
+              <a:rPr lang="en-US" altLang="zh-CHS" dirty="0" smtClean="0"/>
               <a:t>GL_REPEAT</a:t>
             </a:r>
           </a:p>
           <a:p>
             <a:pPr lvl="5"/>
             <a:r>
-              <a:rPr lang="en-US" altLang="zh-CN" dirty="0" smtClean="0"/>
+              <a:rPr lang="en-US" altLang="zh-CHS" dirty="0" smtClean="0"/>
               <a:t>start from 0 again…</a:t>
             </a:r>
           </a:p>
           <a:p>
             <a:pPr lvl="4"/>
             <a:r>
-              <a:rPr lang="en-US" altLang="zh-CN" dirty="0" smtClean="0"/>
+              <a:rPr lang="en-US" altLang="zh-CHS" dirty="0" smtClean="0"/>
               <a:t>GL_CLAMP_TO_EDGE</a:t>
             </a:r>
           </a:p>
           <a:p>
             <a:pPr lvl="4"/>
             <a:r>
-              <a:rPr lang="en-US" altLang="zh-CN" dirty="0" smtClean="0"/>
+              <a:rPr lang="en-US" altLang="zh-CHS" dirty="0" smtClean="0"/>
               <a:t>GL_CLAMP_TO_BORDER</a:t>
             </a:r>
           </a:p>
@@ -6004,7 +6019,7 @@
             <a:pPr lvl="4">
               <a:buNone/>
             </a:pPr>
-            <a:endParaRPr lang="en-US" altLang="zh-CN" dirty="0" smtClean="0"/>
+            <a:endParaRPr lang="en-US" altLang="zh-CHS" dirty="0" smtClean="0"/>
           </a:p>
         </p:txBody>
       </p:sp>
@@ -6026,10 +6041,10 @@
           <a:lstStyle/>
           <a:p>
             <a:r>
-              <a:rPr lang="en-US" altLang="zh-CN" sz="3600" dirty="0" smtClean="0"/>
+              <a:rPr lang="en-US" altLang="zh-CHS" sz="3600" dirty="0" smtClean="0"/>
               <a:t>Main techniques we need</a:t>
             </a:r>
-            <a:endParaRPr lang="zh-CN" altLang="en-US" sz="3600" dirty="0"/>
+            <a:endParaRPr lang="zh-CHS" altLang="en-US" sz="3600" dirty="0"/>
           </a:p>
         </p:txBody>
       </p:sp>
@@ -6083,73 +6098,73 @@
           <a:lstStyle/>
           <a:p>
             <a:r>
-              <a:rPr lang="en-US" altLang="zh-CN" dirty="0" smtClean="0"/>
+              <a:rPr lang="en-US" altLang="zh-CHS" dirty="0" smtClean="0"/>
               <a:t>Texture in OpenGL</a:t>
             </a:r>
           </a:p>
           <a:p>
             <a:pPr lvl="1"/>
             <a:r>
-              <a:rPr lang="en-US" altLang="zh-CN" dirty="0" smtClean="0"/>
+              <a:rPr lang="en-US" altLang="zh-CHS" dirty="0" smtClean="0"/>
               <a:t>Set Texture Parameters</a:t>
             </a:r>
           </a:p>
           <a:p>
             <a:pPr lvl="2"/>
             <a:r>
-              <a:rPr lang="en-US" altLang="zh-CN" dirty="0" smtClean="0"/>
+              <a:rPr lang="en-US" altLang="zh-CHS" dirty="0" smtClean="0"/>
               <a:t>Wrapping</a:t>
             </a:r>
           </a:p>
           <a:p>
             <a:pPr lvl="2"/>
-            <a:endParaRPr lang="en-US" altLang="zh-CN" dirty="0" smtClean="0"/>
+            <a:endParaRPr lang="en-US" altLang="zh-CHS" dirty="0" smtClean="0"/>
           </a:p>
           <a:p>
             <a:pPr lvl="2"/>
-            <a:endParaRPr lang="en-US" altLang="zh-CN" dirty="0" smtClean="0"/>
+            <a:endParaRPr lang="en-US" altLang="zh-CHS" dirty="0" smtClean="0"/>
           </a:p>
           <a:p>
             <a:pPr lvl="2"/>
-            <a:endParaRPr lang="en-US" altLang="zh-CN" dirty="0" smtClean="0"/>
+            <a:endParaRPr lang="en-US" altLang="zh-CHS" dirty="0" smtClean="0"/>
           </a:p>
           <a:p>
             <a:pPr lvl="2"/>
-            <a:endParaRPr lang="en-US" altLang="zh-CN" dirty="0" smtClean="0"/>
+            <a:endParaRPr lang="en-US" altLang="zh-CHS" dirty="0" smtClean="0"/>
           </a:p>
           <a:p>
             <a:pPr lvl="2"/>
-            <a:endParaRPr lang="en-US" altLang="zh-CN" dirty="0" smtClean="0"/>
+            <a:endParaRPr lang="en-US" altLang="zh-CHS" dirty="0" smtClean="0"/>
           </a:p>
           <a:p>
             <a:pPr lvl="2"/>
-            <a:endParaRPr lang="en-US" altLang="zh-CN" dirty="0" smtClean="0"/>
+            <a:endParaRPr lang="en-US" altLang="zh-CHS" dirty="0" smtClean="0"/>
           </a:p>
           <a:p>
             <a:pPr lvl="2"/>
-            <a:endParaRPr lang="en-US" altLang="zh-CN" dirty="0" smtClean="0"/>
+            <a:endParaRPr lang="en-US" altLang="zh-CHS" dirty="0" smtClean="0"/>
           </a:p>
           <a:p>
             <a:pPr lvl="2">
               <a:buNone/>
             </a:pPr>
             <a:r>
-              <a:rPr lang="en-US" altLang="zh-CN" dirty="0" smtClean="0">
+              <a:rPr lang="en-US" altLang="zh-CHS" dirty="0" smtClean="0">
                 <a:hlinkClick r:id="rId2" action="ppaction://hlinkfile"/>
               </a:rPr>
               <a:t>example</a:t>
             </a:r>
-            <a:endParaRPr lang="en-US" altLang="zh-CN" dirty="0" smtClean="0"/>
+            <a:endParaRPr lang="en-US" altLang="zh-CHS" dirty="0" smtClean="0"/>
           </a:p>
           <a:p>
             <a:pPr lvl="2"/>
-            <a:endParaRPr lang="en-US" altLang="zh-CN" dirty="0" smtClean="0"/>
+            <a:endParaRPr lang="en-US" altLang="zh-CHS" dirty="0" smtClean="0"/>
           </a:p>
           <a:p>
             <a:pPr lvl="4">
               <a:buNone/>
             </a:pPr>
-            <a:endParaRPr lang="en-US" altLang="zh-CN" dirty="0" smtClean="0"/>
+            <a:endParaRPr lang="en-US" altLang="zh-CHS" dirty="0" smtClean="0"/>
           </a:p>
         </p:txBody>
       </p:sp>
@@ -6171,10 +6186,10 @@
           <a:lstStyle/>
           <a:p>
             <a:r>
-              <a:rPr lang="en-US" altLang="zh-CN" sz="3600" dirty="0" smtClean="0"/>
+              <a:rPr lang="en-US" altLang="zh-CHS" sz="3600" dirty="0" smtClean="0"/>
               <a:t>Main techniques we need</a:t>
             </a:r>
-            <a:endParaRPr lang="zh-CN" altLang="en-US" sz="3600" dirty="0"/>
+            <a:endParaRPr lang="zh-CHS" altLang="en-US" sz="3600" dirty="0"/>
           </a:p>
         </p:txBody>
       </p:sp>
@@ -6250,14 +6265,14 @@
           <a:lstStyle/>
           <a:p>
             <a:r>
-              <a:rPr lang="en-US" altLang="zh-CN" dirty="0" smtClean="0"/>
+              <a:rPr lang="en-US" altLang="zh-CHS" dirty="0" smtClean="0"/>
               <a:t>Texture in OpenGL</a:t>
             </a:r>
           </a:p>
           <a:p>
             <a:pPr lvl="1"/>
             <a:r>
-              <a:rPr lang="en-US" altLang="zh-CN" dirty="0" smtClean="0"/>
+              <a:rPr lang="en-US" altLang="zh-CHS" dirty="0" smtClean="0"/>
               <a:t>Set Environment</a:t>
             </a:r>
           </a:p>
@@ -6265,68 +6280,68 @@
             <a:pPr lvl="1">
               <a:buNone/>
             </a:pPr>
-            <a:endParaRPr lang="en-US" altLang="zh-CN" dirty="0" smtClean="0"/>
+            <a:endParaRPr lang="en-US" altLang="zh-CHS" dirty="0" smtClean="0"/>
           </a:p>
           <a:p>
             <a:pPr lvl="1"/>
             <a:r>
-              <a:rPr lang="en-US" altLang="zh-CN" b="1" dirty="0" smtClean="0"/>
+              <a:rPr lang="en-US" altLang="zh-CHS" b="1" dirty="0" smtClean="0"/>
               <a:t>void </a:t>
             </a:r>
             <a:r>
-              <a:rPr lang="en-US" altLang="zh-CN" b="1" dirty="0" err="1" smtClean="0"/>
+              <a:rPr lang="en-US" altLang="zh-CHS" b="1" dirty="0" err="1" smtClean="0"/>
               <a:t>glTexEnvfi</a:t>
             </a:r>
             <a:r>
-              <a:rPr lang="en-US" altLang="zh-CN" b="1" dirty="0" smtClean="0"/>
+              <a:rPr lang="en-US" altLang="zh-CHS" b="1" dirty="0" smtClean="0"/>
               <a:t> (</a:t>
             </a:r>
             <a:r>
-              <a:rPr lang="en-US" altLang="zh-CN" b="1" dirty="0" err="1" smtClean="0"/>
+              <a:rPr lang="en-US" altLang="zh-CHS" b="1" dirty="0" err="1" smtClean="0"/>
               <a:t>GLenum</a:t>
             </a:r>
             <a:r>
-              <a:rPr lang="en-US" altLang="zh-CN" b="1" dirty="0" smtClean="0"/>
+              <a:rPr lang="en-US" altLang="zh-CHS" b="1" dirty="0" smtClean="0"/>
               <a:t> </a:t>
             </a:r>
             <a:r>
-              <a:rPr lang="en-US" altLang="zh-CN" b="1" i="1" dirty="0" smtClean="0"/>
+              <a:rPr lang="en-US" altLang="zh-CHS" b="1" i="1" dirty="0" smtClean="0"/>
               <a:t>target</a:t>
             </a:r>
             <a:r>
-              <a:rPr lang="en-US" altLang="zh-CN" b="1" dirty="0" smtClean="0"/>
+              <a:rPr lang="en-US" altLang="zh-CHS" b="1" dirty="0" smtClean="0"/>
               <a:t>, </a:t>
             </a:r>
             <a:r>
-              <a:rPr lang="en-US" altLang="zh-CN" b="1" dirty="0" err="1" smtClean="0"/>
+              <a:rPr lang="en-US" altLang="zh-CHS" b="1" dirty="0" err="1" smtClean="0"/>
               <a:t>GLenum</a:t>
             </a:r>
             <a:r>
-              <a:rPr lang="en-US" altLang="zh-CN" b="1" dirty="0" smtClean="0"/>
+              <a:rPr lang="en-US" altLang="zh-CHS" b="1" dirty="0" smtClean="0"/>
               <a:t> </a:t>
             </a:r>
             <a:r>
-              <a:rPr lang="en-US" altLang="zh-CN" b="1" i="1" dirty="0" err="1" smtClean="0"/>
+              <a:rPr lang="en-US" altLang="zh-CHS" b="1" i="1" dirty="0" err="1" smtClean="0"/>
               <a:t>pname</a:t>
             </a:r>
             <a:r>
-              <a:rPr lang="en-US" altLang="zh-CN" b="1" dirty="0" smtClean="0"/>
+              <a:rPr lang="en-US" altLang="zh-CHS" b="1" dirty="0" smtClean="0"/>
               <a:t>, </a:t>
             </a:r>
             <a:r>
-              <a:rPr lang="en-US" altLang="zh-CN" b="1" dirty="0" err="1" smtClean="0"/>
+              <a:rPr lang="en-US" altLang="zh-CHS" b="1" dirty="0" err="1" smtClean="0"/>
               <a:t>GLint</a:t>
             </a:r>
             <a:r>
-              <a:rPr lang="en-US" altLang="zh-CN" b="1" dirty="0" smtClean="0"/>
+              <a:rPr lang="en-US" altLang="zh-CHS" b="1" dirty="0" smtClean="0"/>
               <a:t> </a:t>
             </a:r>
             <a:r>
-              <a:rPr lang="en-US" altLang="zh-CN" b="1" i="1" dirty="0" err="1" smtClean="0"/>
+              <a:rPr lang="en-US" altLang="zh-CHS" b="1" i="1" dirty="0" err="1" smtClean="0"/>
               <a:t>param</a:t>
             </a:r>
             <a:r>
-              <a:rPr lang="en-US" altLang="zh-CN" b="1" dirty="0" smtClean="0"/>
+              <a:rPr lang="en-US" altLang="zh-CHS" b="1" dirty="0" smtClean="0"/>
               <a:t>)</a:t>
             </a:r>
           </a:p>
@@ -6350,10 +6365,10 @@
           <a:lstStyle/>
           <a:p>
             <a:r>
-              <a:rPr lang="en-US" altLang="zh-CN" sz="3600" dirty="0" smtClean="0"/>
+              <a:rPr lang="en-US" altLang="zh-CHS" sz="3600" dirty="0" smtClean="0"/>
               <a:t>Main techniques we need</a:t>
             </a:r>
-            <a:endParaRPr lang="zh-CN" altLang="en-US" sz="3600" dirty="0"/>
+            <a:endParaRPr lang="zh-CHS" altLang="en-US" sz="3600" dirty="0"/>
           </a:p>
         </p:txBody>
       </p:sp>
@@ -6407,96 +6422,96 @@
           <a:lstStyle/>
           <a:p>
             <a:r>
-              <a:rPr lang="en-US" altLang="zh-CN" dirty="0" smtClean="0"/>
+              <a:rPr lang="en-US" altLang="zh-CHS" dirty="0" smtClean="0"/>
               <a:t>Texture in OpenGL</a:t>
             </a:r>
           </a:p>
           <a:p>
             <a:pPr lvl="1"/>
             <a:r>
-              <a:rPr lang="en-US" altLang="zh-CN" dirty="0" smtClean="0"/>
+              <a:rPr lang="en-US" altLang="zh-CHS" dirty="0" smtClean="0"/>
               <a:t>Set Environment</a:t>
             </a:r>
           </a:p>
           <a:p>
             <a:pPr lvl="2"/>
             <a:r>
-              <a:rPr lang="en-US" altLang="zh-CN" dirty="0" smtClean="0"/>
+              <a:rPr lang="en-US" altLang="zh-CHS" dirty="0" smtClean="0"/>
               <a:t>Mix texture with colors</a:t>
             </a:r>
           </a:p>
           <a:p>
             <a:pPr lvl="2"/>
             <a:r>
-              <a:rPr lang="en-US" altLang="zh-CN" i="1" dirty="0" err="1" smtClean="0"/>
+              <a:rPr lang="en-US" altLang="zh-CHS" i="1" dirty="0" err="1" smtClean="0"/>
               <a:t>pname</a:t>
             </a:r>
-            <a:endParaRPr lang="en-US" altLang="zh-CN" i="1" dirty="0" smtClean="0"/>
+            <a:endParaRPr lang="en-US" altLang="zh-CHS" i="1" dirty="0" smtClean="0"/>
           </a:p>
           <a:p>
             <a:pPr lvl="3"/>
             <a:r>
-              <a:rPr lang="en-US" altLang="zh-CN" dirty="0" smtClean="0"/>
+              <a:rPr lang="en-US" altLang="zh-CHS" dirty="0" smtClean="0"/>
               <a:t>GL_TEXTURE_ENV_COLOR</a:t>
             </a:r>
           </a:p>
           <a:p>
             <a:pPr lvl="2"/>
             <a:r>
-              <a:rPr lang="en-US" altLang="zh-CN" i="1" dirty="0" err="1" smtClean="0"/>
+              <a:rPr lang="en-US" altLang="zh-CHS" i="1" dirty="0" err="1" smtClean="0"/>
               <a:t>param</a:t>
             </a:r>
-            <a:endParaRPr lang="en-US" altLang="zh-CN" dirty="0" smtClean="0"/>
+            <a:endParaRPr lang="en-US" altLang="zh-CHS" dirty="0" smtClean="0"/>
           </a:p>
           <a:p>
             <a:pPr lvl="3"/>
             <a:r>
-              <a:rPr lang="en-US" altLang="zh-CN" dirty="0" smtClean="0"/>
+              <a:rPr lang="en-US" altLang="zh-CHS" dirty="0" smtClean="0"/>
               <a:t>GL_MODULATE</a:t>
             </a:r>
           </a:p>
           <a:p>
             <a:pPr lvl="3"/>
             <a:r>
-              <a:rPr lang="en-US" altLang="zh-CN" dirty="0" smtClean="0"/>
+              <a:rPr lang="en-US" altLang="zh-CHS" dirty="0" smtClean="0"/>
               <a:t>GL_REPLACE</a:t>
             </a:r>
           </a:p>
           <a:p>
             <a:pPr lvl="3"/>
             <a:r>
-              <a:rPr lang="en-US" altLang="zh-CN" dirty="0" smtClean="0"/>
+              <a:rPr lang="en-US" altLang="zh-CHS" dirty="0" smtClean="0"/>
               <a:t>GL_DECAL</a:t>
             </a:r>
           </a:p>
           <a:p>
             <a:pPr lvl="3"/>
             <a:r>
-              <a:rPr lang="en-US" altLang="zh-CN" dirty="0" smtClean="0"/>
+              <a:rPr lang="en-US" altLang="zh-CHS" dirty="0" smtClean="0"/>
               <a:t>GL_ADD</a:t>
             </a:r>
           </a:p>
           <a:p>
             <a:pPr lvl="3"/>
-            <a:endParaRPr lang="en-US" altLang="zh-CN" dirty="0" smtClean="0"/>
+            <a:endParaRPr lang="en-US" altLang="zh-CHS" dirty="0" smtClean="0"/>
           </a:p>
           <a:p>
             <a:pPr lvl="3">
               <a:buNone/>
             </a:pPr>
             <a:r>
-              <a:rPr lang="en-US" altLang="zh-CN" dirty="0" smtClean="0">
+              <a:rPr lang="en-US" altLang="zh-CHS" dirty="0" smtClean="0">
                 <a:hlinkClick r:id="rId2" action="ppaction://hlinkfile"/>
               </a:rPr>
               <a:t>example</a:t>
             </a:r>
-            <a:endParaRPr lang="en-US" altLang="zh-CN" dirty="0" smtClean="0"/>
+            <a:endParaRPr lang="en-US" altLang="zh-CHS" dirty="0" smtClean="0"/>
           </a:p>
           <a:p>
             <a:pPr lvl="4">
               <a:buNone/>
             </a:pPr>
-            <a:endParaRPr lang="en-US" altLang="zh-CN" dirty="0" smtClean="0"/>
+            <a:endParaRPr lang="en-US" altLang="zh-CHS" dirty="0" smtClean="0"/>
           </a:p>
         </p:txBody>
       </p:sp>
@@ -6518,10 +6533,10 @@
           <a:lstStyle/>
           <a:p>
             <a:r>
-              <a:rPr lang="en-US" altLang="zh-CN" sz="3600" dirty="0" smtClean="0"/>
+              <a:rPr lang="en-US" altLang="zh-CHS" sz="3600" dirty="0" smtClean="0"/>
               <a:t>Main techniques we need</a:t>
             </a:r>
-            <a:endParaRPr lang="zh-CN" altLang="en-US" sz="3600" dirty="0"/>
+            <a:endParaRPr lang="zh-CHS" altLang="en-US" sz="3600" dirty="0"/>
           </a:p>
         </p:txBody>
       </p:sp>
@@ -6575,42 +6590,42 @@
           <a:lstStyle/>
           <a:p>
             <a:r>
-              <a:rPr lang="en-US" altLang="zh-CN" dirty="0" smtClean="0"/>
+              <a:rPr lang="en-US" altLang="zh-CHS" dirty="0" smtClean="0"/>
               <a:t>Texture in OpenGL</a:t>
             </a:r>
           </a:p>
           <a:p>
             <a:pPr lvl="1"/>
             <a:r>
-              <a:rPr lang="en-US" altLang="zh-CN" dirty="0" smtClean="0"/>
+              <a:rPr lang="en-US" altLang="zh-CHS" dirty="0" smtClean="0"/>
               <a:t>Render</a:t>
             </a:r>
           </a:p>
           <a:p>
             <a:pPr lvl="2"/>
             <a:r>
-              <a:rPr lang="en-US" altLang="zh-CN" dirty="0" smtClean="0"/>
+              <a:rPr lang="en-US" altLang="zh-CHS" dirty="0" smtClean="0"/>
               <a:t>We need to assign texture coordinate to each vertex</a:t>
             </a:r>
           </a:p>
           <a:p>
             <a:pPr lvl="2"/>
-            <a:endParaRPr lang="en-US" altLang="zh-CN" dirty="0" smtClean="0"/>
+            <a:endParaRPr lang="en-US" altLang="zh-CHS" dirty="0" smtClean="0"/>
           </a:p>
           <a:p>
             <a:pPr lvl="2">
               <a:buNone/>
             </a:pPr>
             <a:r>
-              <a:rPr lang="en-US" altLang="zh-CN" dirty="0" smtClean="0"/>
+              <a:rPr lang="en-US" altLang="zh-CHS" dirty="0" smtClean="0"/>
               <a:t>	</a:t>
             </a:r>
             <a:r>
-              <a:rPr lang="en-US" altLang="zh-CN" dirty="0" err="1" smtClean="0"/>
+              <a:rPr lang="en-US" altLang="zh-CHS" dirty="0" err="1" smtClean="0"/>
               <a:t>glEnable</a:t>
             </a:r>
             <a:r>
-              <a:rPr lang="en-US" altLang="zh-CN" dirty="0" smtClean="0"/>
+              <a:rPr lang="en-US" altLang="zh-CHS" dirty="0" smtClean="0"/>
               <a:t>(GL_TEXTURE_2D)</a:t>
             </a:r>
           </a:p>
@@ -6619,39 +6634,39 @@
               <a:buNone/>
             </a:pPr>
             <a:r>
-              <a:rPr lang="en-US" altLang="zh-CN" dirty="0" smtClean="0"/>
+              <a:rPr lang="en-US" altLang="zh-CHS" dirty="0" smtClean="0"/>
               <a:t>	</a:t>
             </a:r>
             <a:r>
-              <a:rPr lang="en-US" altLang="zh-CN" dirty="0" err="1" smtClean="0"/>
+              <a:rPr lang="en-US" altLang="zh-CHS" dirty="0" err="1" smtClean="0"/>
               <a:t>glBindTexture</a:t>
             </a:r>
             <a:r>
-              <a:rPr lang="en-US" altLang="zh-CN" dirty="0" smtClean="0"/>
+              <a:rPr lang="en-US" altLang="zh-CHS" dirty="0" smtClean="0"/>
               <a:t>(GL_TEXTURE_2D, </a:t>
             </a:r>
             <a:r>
-              <a:rPr lang="en-US" altLang="zh-CN" i="1" dirty="0" err="1" smtClean="0"/>
+              <a:rPr lang="en-US" altLang="zh-CHS" i="1" dirty="0" err="1" smtClean="0"/>
               <a:t>texturehandle</a:t>
             </a:r>
             <a:r>
-              <a:rPr lang="en-US" altLang="zh-CN" dirty="0" smtClean="0"/>
+              <a:rPr lang="en-US" altLang="zh-CHS" dirty="0" smtClean="0"/>
               <a:t>);</a:t>
             </a:r>
-            <a:endParaRPr lang="en-US" altLang="zh-CN" i="1" dirty="0" smtClean="0"/>
+            <a:endParaRPr lang="en-US" altLang="zh-CHS" i="1" dirty="0" smtClean="0"/>
           </a:p>
           <a:p>
             <a:pPr lvl="2">
               <a:buNone/>
             </a:pPr>
-            <a:endParaRPr lang="en-US" altLang="zh-CN" i="1" dirty="0" smtClean="0"/>
+            <a:endParaRPr lang="en-US" altLang="zh-CHS" i="1" dirty="0" smtClean="0"/>
           </a:p>
           <a:p>
             <a:pPr lvl="2">
               <a:buNone/>
             </a:pPr>
             <a:r>
-              <a:rPr lang="en-US" altLang="zh-CN" dirty="0" smtClean="0"/>
+              <a:rPr lang="en-US" altLang="zh-CHS" dirty="0" smtClean="0"/>
               <a:t>	{	</a:t>
             </a:r>
           </a:p>
@@ -6660,23 +6675,23 @@
               <a:buNone/>
             </a:pPr>
             <a:r>
-              <a:rPr lang="en-US" altLang="zh-CN" dirty="0" smtClean="0"/>
+              <a:rPr lang="en-US" altLang="zh-CHS" dirty="0" smtClean="0"/>
               <a:t>		glTexCoord2f(</a:t>
             </a:r>
             <a:r>
-              <a:rPr lang="en-US" altLang="zh-CN" i="1" dirty="0" err="1" smtClean="0"/>
+              <a:rPr lang="en-US" altLang="zh-CHS" i="1" dirty="0" err="1" smtClean="0"/>
               <a:t>s_coord</a:t>
             </a:r>
             <a:r>
-              <a:rPr lang="en-US" altLang="zh-CN" dirty="0" smtClean="0"/>
+              <a:rPr lang="en-US" altLang="zh-CHS" dirty="0" smtClean="0"/>
               <a:t>, </a:t>
             </a:r>
             <a:r>
-              <a:rPr lang="en-US" altLang="zh-CN" i="1" dirty="0" err="1" smtClean="0"/>
+              <a:rPr lang="en-US" altLang="zh-CHS" i="1" dirty="0" err="1" smtClean="0"/>
               <a:t>t_coord</a:t>
             </a:r>
             <a:r>
-              <a:rPr lang="en-US" altLang="zh-CN" dirty="0" smtClean="0"/>
+              <a:rPr lang="en-US" altLang="zh-CHS" dirty="0" smtClean="0"/>
               <a:t>);</a:t>
             </a:r>
           </a:p>
@@ -6685,7 +6700,7 @@
               <a:buNone/>
             </a:pPr>
             <a:r>
-              <a:rPr lang="en-US" altLang="zh-CN" dirty="0" smtClean="0"/>
+              <a:rPr lang="en-US" altLang="zh-CHS" dirty="0" smtClean="0"/>
               <a:t>		glVertex3f(…);</a:t>
             </a:r>
           </a:p>
@@ -6694,12 +6709,12 @@
               <a:buNone/>
             </a:pPr>
             <a:r>
-              <a:rPr lang="en-US" altLang="zh-CN" dirty="0" smtClean="0"/>
+              <a:rPr lang="en-US" altLang="zh-CHS" dirty="0" smtClean="0"/>
               <a:t>	}</a:t>
             </a:r>
           </a:p>
           <a:p>
-            <a:endParaRPr lang="en-US" altLang="zh-CN" dirty="0" smtClean="0"/>
+            <a:endParaRPr lang="en-US" altLang="zh-CHS" dirty="0" smtClean="0"/>
           </a:p>
         </p:txBody>
       </p:sp>
@@ -6721,10 +6736,10 @@
           <a:lstStyle/>
           <a:p>
             <a:r>
-              <a:rPr lang="en-US" altLang="zh-CN" sz="3600" dirty="0" smtClean="0"/>
+              <a:rPr lang="en-US" altLang="zh-CHS" sz="3600" dirty="0" smtClean="0"/>
               <a:t>Main techniques we need</a:t>
             </a:r>
-            <a:endParaRPr lang="zh-CN" altLang="en-US" sz="3600" dirty="0"/>
+            <a:endParaRPr lang="zh-CHS" altLang="en-US" sz="3600" dirty="0"/>
           </a:p>
         </p:txBody>
       </p:sp>
@@ -6776,7 +6791,7 @@
           <a:lstStyle/>
           <a:p>
             <a:r>
-              <a:rPr lang="en-US" altLang="zh-CN" dirty="0" smtClean="0">
+              <a:rPr lang="en-US" altLang="zh-CHS" dirty="0" smtClean="0">
                 <a:solidFill>
                   <a:srgbClr val="FF0000"/>
                 </a:solidFill>
@@ -6786,13 +6801,13 @@
           </a:p>
           <a:p>
             <a:r>
-              <a:rPr lang="en-US" altLang="zh-CN" dirty="0" smtClean="0"/>
+              <a:rPr lang="en-US" altLang="zh-CHS" dirty="0" smtClean="0"/>
               <a:t>Main techniques we need</a:t>
             </a:r>
           </a:p>
           <a:p>
             <a:r>
-              <a:rPr lang="en-US" altLang="zh-CN" dirty="0" smtClean="0"/>
+              <a:rPr lang="en-US" altLang="zh-CHS" dirty="0" smtClean="0"/>
               <a:t>Exercise time &amp; Some more (Optional)</a:t>
             </a:r>
           </a:p>
@@ -6814,10 +6829,10 @@
           <a:lstStyle/>
           <a:p>
             <a:r>
-              <a:rPr lang="en-US" altLang="zh-CN" dirty="0" smtClean="0"/>
+              <a:rPr lang="en-US" altLang="zh-CHS" dirty="0" smtClean="0"/>
               <a:t>Week 5</a:t>
             </a:r>
-            <a:endParaRPr lang="zh-CN" altLang="en-US" dirty="0"/>
+            <a:endParaRPr lang="zh-CHS" altLang="en-US" dirty="0"/>
           </a:p>
         </p:txBody>
       </p:sp>
@@ -6869,19 +6884,19 @@
           <a:lstStyle/>
           <a:p>
             <a:r>
-              <a:rPr lang="en-US" altLang="zh-CN" dirty="0" smtClean="0"/>
+              <a:rPr lang="en-US" altLang="zh-CHS" dirty="0" smtClean="0"/>
               <a:t>What will we do?</a:t>
             </a:r>
           </a:p>
           <a:p>
             <a:r>
-              <a:rPr lang="en-US" altLang="zh-CN" dirty="0" smtClean="0"/>
+              <a:rPr lang="en-US" altLang="zh-CHS" dirty="0" smtClean="0"/>
               <a:t>Main techniques we need</a:t>
             </a:r>
           </a:p>
           <a:p>
             <a:r>
-              <a:rPr lang="en-US" altLang="zh-CN" dirty="0" smtClean="0">
+              <a:rPr lang="en-US" altLang="zh-CHS" dirty="0" smtClean="0">
                 <a:solidFill>
                   <a:srgbClr val="FF0000"/>
                 </a:solidFill>
@@ -6907,10 +6922,10 @@
           <a:lstStyle/>
           <a:p>
             <a:r>
-              <a:rPr lang="en-US" altLang="zh-CN" dirty="0" smtClean="0"/>
+              <a:rPr lang="en-US" altLang="zh-CHS" dirty="0" smtClean="0"/>
               <a:t>Week 5</a:t>
             </a:r>
-            <a:endParaRPr lang="zh-CN" altLang="en-US" dirty="0"/>
+            <a:endParaRPr lang="zh-CHS" altLang="en-US" dirty="0"/>
           </a:p>
         </p:txBody>
       </p:sp>
@@ -6969,14 +6984,14 @@
           <a:lstStyle/>
           <a:p>
             <a:r>
-              <a:rPr lang="en-US" altLang="zh-CN" sz="2200" dirty="0" smtClean="0"/>
+              <a:rPr lang="en-US" altLang="zh-CHS" sz="2200" dirty="0" smtClean="0"/>
               <a:t>Any of the examples is acceptable</a:t>
             </a:r>
-            <a:endParaRPr lang="en-US" altLang="zh-CN" sz="1800" dirty="0" smtClean="0"/>
+            <a:endParaRPr lang="en-US" altLang="zh-CHS" sz="1800" dirty="0" smtClean="0"/>
           </a:p>
           <a:p>
             <a:pPr lvl="1"/>
-            <a:endParaRPr lang="en-US" altLang="zh-CN" sz="1800" dirty="0" smtClean="0"/>
+            <a:endParaRPr lang="en-US" altLang="zh-CHS" sz="1800" dirty="0" smtClean="0"/>
           </a:p>
         </p:txBody>
       </p:sp>
@@ -7003,10 +7018,10 @@
           <a:lstStyle/>
           <a:p>
             <a:r>
-              <a:rPr lang="en-US" altLang="zh-CN" sz="3600" dirty="0" smtClean="0"/>
+              <a:rPr lang="en-US" altLang="zh-CHS" sz="3600" dirty="0" smtClean="0"/>
               <a:t>Some more(Optional)…</a:t>
             </a:r>
-            <a:endParaRPr lang="zh-CN" altLang="en-US" sz="3600" dirty="0"/>
+            <a:endParaRPr lang="zh-CHS" altLang="en-US" sz="3600" dirty="0"/>
           </a:p>
         </p:txBody>
       </p:sp>
@@ -7058,7 +7073,7 @@
               <a:defRPr/>
             </a:pPr>
             <a:r>
-              <a:rPr kumimoji="0" lang="en-US" altLang="zh-CN" sz="3600" b="1" i="0" u="none" strike="noStrike" kern="1200" cap="none" spc="0" normalizeH="0" baseline="0" noProof="0" dirty="0" smtClean="0">
+              <a:rPr kumimoji="0" lang="en-US" altLang="zh-CHS" sz="3600" b="1" i="0" u="none" strike="noStrike" kern="1200" cap="none" spc="0" normalizeH="0" baseline="0" noProof="0" dirty="0" smtClean="0">
                 <a:ln>
                   <a:noFill/>
                 </a:ln>
@@ -7080,7 +7095,7 @@
               </a:rPr>
               <a:t>Exercise time</a:t>
             </a:r>
-            <a:endParaRPr kumimoji="0" lang="zh-CN" altLang="en-US" sz="3600" b="1" i="0" u="none" strike="noStrike" kern="1200" cap="none" spc="0" normalizeH="0" baseline="0" noProof="0" dirty="0">
+            <a:endParaRPr kumimoji="0" lang="zh-CHS" altLang="en-US" sz="3600" b="1" i="0" u="none" strike="noStrike" kern="1200" cap="none" spc="0" normalizeH="0" baseline="0" noProof="0" dirty="0">
               <a:ln>
                 <a:noFill/>
               </a:ln>
@@ -7145,7 +7160,7 @@
               <a:tabLst/>
               <a:defRPr/>
             </a:pPr>
-            <a:endParaRPr lang="en-US" altLang="zh-CN" sz="2200" dirty="0" smtClean="0"/>
+            <a:endParaRPr lang="en-US" altLang="zh-CHS" sz="2200" dirty="0" smtClean="0"/>
           </a:p>
         </p:txBody>
       </p:sp>
@@ -7187,7 +7202,7 @@
           <a:lstStyle/>
           <a:p>
             <a:pPr algn="ctr"/>
-            <a:endParaRPr lang="zh-CN" altLang="en-US"/>
+            <a:endParaRPr lang="zh-CHS" altLang="en-US"/>
           </a:p>
         </p:txBody>
       </p:sp>
@@ -7241,51 +7256,51 @@
           <a:lstStyle/>
           <a:p>
             <a:r>
-              <a:rPr lang="en-US" altLang="zh-CN" dirty="0" smtClean="0"/>
+              <a:rPr lang="en-US" altLang="zh-CHS" dirty="0" smtClean="0"/>
               <a:t>Texture – Filter</a:t>
             </a:r>
           </a:p>
           <a:p>
             <a:pPr lvl="1"/>
             <a:r>
-              <a:rPr lang="en-US" altLang="zh-CN" dirty="0" smtClean="0">
+              <a:rPr lang="en-US" altLang="zh-CHS" dirty="0" smtClean="0">
                 <a:hlinkClick r:id="rId2" action="ppaction://hlinkfile"/>
               </a:rPr>
               <a:t>example</a:t>
             </a:r>
-            <a:endParaRPr lang="en-US" altLang="zh-CN" dirty="0" smtClean="0"/>
-          </a:p>
-          <a:p>
-            <a:r>
-              <a:rPr lang="en-US" altLang="zh-CN" dirty="0" smtClean="0"/>
+            <a:endParaRPr lang="en-US" altLang="zh-CHS" dirty="0" smtClean="0"/>
+          </a:p>
+          <a:p>
+            <a:r>
+              <a:rPr lang="en-US" altLang="zh-CHS" dirty="0" smtClean="0"/>
               <a:t>Wandering</a:t>
             </a:r>
           </a:p>
           <a:p>
             <a:pPr lvl="1"/>
             <a:r>
-              <a:rPr lang="en-US" altLang="zh-CN" dirty="0" smtClean="0">
+              <a:rPr lang="en-US" altLang="zh-CHS" dirty="0" smtClean="0">
                 <a:hlinkClick r:id="rId3" action="ppaction://hlinkfile"/>
               </a:rPr>
               <a:t>example</a:t>
             </a:r>
-            <a:endParaRPr lang="en-US" altLang="zh-CN" dirty="0" smtClean="0"/>
-          </a:p>
-          <a:p>
-            <a:r>
-              <a:rPr lang="en-US" altLang="zh-CN" dirty="0" smtClean="0"/>
+            <a:endParaRPr lang="en-US" altLang="zh-CHS" dirty="0" smtClean="0"/>
+          </a:p>
+          <a:p>
+            <a:r>
+              <a:rPr lang="en-US" altLang="zh-CHS" dirty="0" smtClean="0"/>
               <a:t>Texture Environment</a:t>
             </a:r>
           </a:p>
           <a:p>
             <a:pPr lvl="1"/>
             <a:r>
-              <a:rPr lang="en-US" altLang="zh-CN" dirty="0" smtClean="0">
+              <a:rPr lang="en-US" altLang="zh-CHS" dirty="0" smtClean="0">
                 <a:hlinkClick r:id="rId4" action="ppaction://hlinkfile"/>
               </a:rPr>
               <a:t>example</a:t>
             </a:r>
-            <a:endParaRPr lang="en-US" altLang="zh-CN" dirty="0" smtClean="0"/>
+            <a:endParaRPr lang="en-US" altLang="zh-CHS" dirty="0" smtClean="0"/>
           </a:p>
         </p:txBody>
       </p:sp>
@@ -7305,10 +7320,10 @@
           <a:lstStyle/>
           <a:p>
             <a:r>
-              <a:rPr lang="en-US" altLang="zh-CN" dirty="0" smtClean="0"/>
+              <a:rPr lang="en-US" altLang="zh-CHS" dirty="0" smtClean="0"/>
               <a:t>What will we do?</a:t>
             </a:r>
-            <a:endParaRPr lang="zh-CN" altLang="en-US" dirty="0"/>
+            <a:endParaRPr lang="zh-CHS" altLang="en-US" dirty="0"/>
           </a:p>
         </p:txBody>
       </p:sp>
@@ -7350,7 +7365,7 @@
           <a:lstStyle/>
           <a:p>
             <a:pPr algn="ctr"/>
-            <a:endParaRPr lang="zh-CN" altLang="en-US"/>
+            <a:endParaRPr lang="zh-CHS" altLang="en-US"/>
           </a:p>
         </p:txBody>
       </p:sp>
@@ -7392,7 +7407,7 @@
           <a:lstStyle/>
           <a:p>
             <a:pPr algn="ctr"/>
-            <a:endParaRPr lang="zh-CN" altLang="en-US"/>
+            <a:endParaRPr lang="zh-CHS" altLang="en-US"/>
           </a:p>
         </p:txBody>
       </p:sp>
@@ -7444,13 +7459,13 @@
           <a:lstStyle/>
           <a:p>
             <a:r>
-              <a:rPr lang="en-US" altLang="zh-CN" dirty="0" smtClean="0"/>
+              <a:rPr lang="en-US" altLang="zh-CHS" dirty="0" smtClean="0"/>
               <a:t>What will we do?</a:t>
             </a:r>
           </a:p>
           <a:p>
             <a:r>
-              <a:rPr lang="en-US" altLang="zh-CN" dirty="0" smtClean="0">
+              <a:rPr lang="en-US" altLang="zh-CHS" dirty="0" smtClean="0">
                 <a:solidFill>
                   <a:srgbClr val="FF0000"/>
                 </a:solidFill>
@@ -7460,7 +7475,7 @@
           </a:p>
           <a:p>
             <a:r>
-              <a:rPr lang="en-US" altLang="zh-CN" dirty="0" smtClean="0"/>
+              <a:rPr lang="en-US" altLang="zh-CHS" dirty="0" smtClean="0"/>
               <a:t>Exercise time &amp; Some more (Optional)</a:t>
             </a:r>
           </a:p>
@@ -7482,10 +7497,10 @@
           <a:lstStyle/>
           <a:p>
             <a:r>
-              <a:rPr lang="en-US" altLang="zh-CN" dirty="0" smtClean="0"/>
+              <a:rPr lang="en-US" altLang="zh-CHS" dirty="0" smtClean="0"/>
               <a:t>Week 5</a:t>
             </a:r>
-            <a:endParaRPr lang="zh-CN" altLang="en-US" dirty="0"/>
+            <a:endParaRPr lang="zh-CHS" altLang="en-US" dirty="0"/>
           </a:p>
         </p:txBody>
       </p:sp>
@@ -7537,42 +7552,42 @@
           <a:lstStyle/>
           <a:p>
             <a:r>
-              <a:rPr lang="en-US" altLang="zh-CN" dirty="0" smtClean="0"/>
+              <a:rPr lang="en-US" altLang="zh-CHS" dirty="0" smtClean="0"/>
               <a:t>Texture in OpenGL</a:t>
             </a:r>
           </a:p>
           <a:p>
             <a:pPr lvl="1"/>
             <a:r>
-              <a:rPr lang="en-US" altLang="zh-CN" dirty="0" smtClean="0"/>
+              <a:rPr lang="en-US" altLang="zh-CHS" dirty="0" smtClean="0"/>
               <a:t>Basic Steps</a:t>
             </a:r>
           </a:p>
           <a:p>
             <a:pPr lvl="2"/>
             <a:r>
-              <a:rPr lang="en-US" altLang="zh-CN" dirty="0" smtClean="0"/>
+              <a:rPr lang="en-US" altLang="zh-CHS" dirty="0" smtClean="0"/>
               <a:t>Generate texture handles</a:t>
             </a:r>
           </a:p>
           <a:p>
             <a:pPr lvl="3"/>
             <a:r>
-              <a:rPr lang="en-US" altLang="zh-CN" dirty="0" smtClean="0"/>
+              <a:rPr lang="en-US" altLang="zh-CHS" dirty="0" smtClean="0"/>
               <a:t>To distinguish from other textures</a:t>
             </a:r>
           </a:p>
           <a:p>
             <a:pPr lvl="2"/>
             <a:r>
-              <a:rPr lang="en-US" altLang="zh-CN" dirty="0" smtClean="0"/>
+              <a:rPr lang="en-US" altLang="zh-CHS" dirty="0" smtClean="0"/>
               <a:t>Read (image) data for each handle</a:t>
             </a:r>
           </a:p>
           <a:p>
             <a:pPr lvl="2"/>
             <a:r>
-              <a:rPr lang="en-US" altLang="zh-CN" dirty="0" smtClean="0">
+              <a:rPr lang="en-US" altLang="zh-CHS" dirty="0" smtClean="0">
                 <a:solidFill>
                   <a:srgbClr val="00B050"/>
                 </a:solidFill>
@@ -7583,7 +7598,7 @@
           <a:p>
             <a:pPr lvl="3"/>
             <a:r>
-              <a:rPr lang="en-US" altLang="zh-CN" dirty="0" smtClean="0">
+              <a:rPr lang="en-US" altLang="zh-CHS" dirty="0" smtClean="0">
                 <a:solidFill>
                   <a:srgbClr val="00B050"/>
                 </a:solidFill>
@@ -7594,7 +7609,7 @@
           <a:p>
             <a:pPr lvl="2"/>
             <a:r>
-              <a:rPr lang="en-US" altLang="zh-CN" dirty="0" smtClean="0">
+              <a:rPr lang="en-US" altLang="zh-CHS" dirty="0" smtClean="0">
                 <a:solidFill>
                   <a:srgbClr val="00B050"/>
                 </a:solidFill>
@@ -7622,10 +7637,10 @@
           <a:lstStyle/>
           <a:p>
             <a:r>
-              <a:rPr lang="en-US" altLang="zh-CN" sz="3600" dirty="0" smtClean="0"/>
+              <a:rPr lang="en-US" altLang="zh-CHS" sz="3600" dirty="0" smtClean="0"/>
               <a:t>Main techniques we need</a:t>
             </a:r>
-            <a:endParaRPr lang="zh-CN" altLang="en-US" sz="3600" dirty="0"/>
+            <a:endParaRPr lang="zh-CHS" altLang="en-US" sz="3600" dirty="0"/>
           </a:p>
         </p:txBody>
       </p:sp>
@@ -7677,14 +7692,14 @@
           <a:lstStyle/>
           <a:p>
             <a:r>
-              <a:rPr lang="en-US" altLang="zh-CN" dirty="0" smtClean="0"/>
+              <a:rPr lang="en-US" altLang="zh-CHS" dirty="0" smtClean="0"/>
               <a:t>Texture in OpenGL</a:t>
             </a:r>
           </a:p>
           <a:p>
             <a:pPr lvl="1"/>
             <a:r>
-              <a:rPr lang="en-US" altLang="zh-CN" dirty="0" smtClean="0"/>
+              <a:rPr lang="en-US" altLang="zh-CHS" dirty="0" smtClean="0"/>
               <a:t>Set Parameters</a:t>
             </a:r>
           </a:p>
@@ -7692,89 +7707,89 @@
             <a:pPr lvl="1">
               <a:buNone/>
             </a:pPr>
-            <a:endParaRPr lang="en-US" altLang="zh-CN" dirty="0" smtClean="0"/>
+            <a:endParaRPr lang="en-US" altLang="zh-CHS" dirty="0" smtClean="0"/>
           </a:p>
           <a:p>
             <a:pPr lvl="1"/>
             <a:r>
-              <a:rPr lang="en-US" altLang="zh-CN" b="1" dirty="0" smtClean="0"/>
+              <a:rPr lang="en-US" altLang="zh-CHS" b="1" dirty="0" smtClean="0"/>
               <a:t>void </a:t>
             </a:r>
             <a:r>
-              <a:rPr lang="en-US" altLang="zh-CN" b="1" dirty="0" err="1" smtClean="0"/>
+              <a:rPr lang="en-US" altLang="zh-CHS" b="1" dirty="0" err="1" smtClean="0"/>
               <a:t>glTexParameters</a:t>
             </a:r>
             <a:r>
-              <a:rPr lang="en-US" altLang="zh-CN" b="1" dirty="0" smtClean="0"/>
+              <a:rPr lang="en-US" altLang="zh-CHS" b="1" dirty="0" smtClean="0"/>
               <a:t>{f/</a:t>
             </a:r>
             <a:r>
-              <a:rPr lang="en-US" altLang="zh-CN" b="1" dirty="0" err="1" smtClean="0"/>
+              <a:rPr lang="en-US" altLang="zh-CHS" b="1" dirty="0" err="1" smtClean="0"/>
               <a:t>i</a:t>
             </a:r>
             <a:r>
-              <a:rPr lang="en-US" altLang="zh-CN" b="1" dirty="0" smtClean="0"/>
+              <a:rPr lang="en-US" altLang="zh-CHS" b="1" dirty="0" smtClean="0"/>
               <a:t>/fv/iv}(</a:t>
             </a:r>
             <a:r>
-              <a:rPr lang="en-US" altLang="zh-CN" b="1" dirty="0" err="1" smtClean="0"/>
+              <a:rPr lang="en-US" altLang="zh-CHS" b="1" dirty="0" err="1" smtClean="0"/>
               <a:t>GLenum</a:t>
             </a:r>
             <a:r>
-              <a:rPr lang="en-US" altLang="zh-CN" b="1" dirty="0" smtClean="0"/>
+              <a:rPr lang="en-US" altLang="zh-CHS" b="1" dirty="0" smtClean="0"/>
               <a:t> </a:t>
             </a:r>
             <a:r>
-              <a:rPr lang="en-US" altLang="zh-CN" b="1" i="1" dirty="0" smtClean="0"/>
+              <a:rPr lang="en-US" altLang="zh-CHS" b="1" i="1" dirty="0" smtClean="0"/>
               <a:t>target</a:t>
             </a:r>
             <a:r>
-              <a:rPr lang="en-US" altLang="zh-CN" b="1" dirty="0" smtClean="0"/>
+              <a:rPr lang="en-US" altLang="zh-CHS" b="1" dirty="0" smtClean="0"/>
               <a:t>, </a:t>
             </a:r>
             <a:r>
-              <a:rPr lang="en-US" altLang="zh-CN" b="1" dirty="0" err="1" smtClean="0"/>
+              <a:rPr lang="en-US" altLang="zh-CHS" b="1" dirty="0" err="1" smtClean="0"/>
               <a:t>GLenum</a:t>
             </a:r>
             <a:r>
-              <a:rPr lang="en-US" altLang="zh-CN" b="1" dirty="0" smtClean="0"/>
+              <a:rPr lang="en-US" altLang="zh-CHS" b="1" dirty="0" smtClean="0"/>
               <a:t> </a:t>
             </a:r>
             <a:r>
-              <a:rPr lang="en-US" altLang="zh-CN" b="1" i="1" dirty="0" err="1" smtClean="0"/>
+              <a:rPr lang="en-US" altLang="zh-CHS" b="1" i="1" dirty="0" err="1" smtClean="0"/>
               <a:t>pname</a:t>
             </a:r>
             <a:r>
-              <a:rPr lang="en-US" altLang="zh-CN" b="1" dirty="0" smtClean="0"/>
+              <a:rPr lang="en-US" altLang="zh-CHS" b="1" dirty="0" smtClean="0"/>
               <a:t>, </a:t>
             </a:r>
             <a:r>
-              <a:rPr lang="en-US" altLang="zh-CN" b="1" dirty="0" err="1" smtClean="0"/>
+              <a:rPr lang="en-US" altLang="zh-CHS" b="1" dirty="0" err="1" smtClean="0"/>
               <a:t>GLfloat</a:t>
             </a:r>
             <a:r>
-              <a:rPr lang="en-US" altLang="zh-CN" b="1" dirty="0" smtClean="0"/>
+              <a:rPr lang="en-US" altLang="zh-CHS" b="1" dirty="0" smtClean="0"/>
               <a:t> </a:t>
             </a:r>
             <a:r>
-              <a:rPr lang="en-US" altLang="zh-CN" b="1" i="1" dirty="0" err="1" smtClean="0"/>
+              <a:rPr lang="en-US" altLang="zh-CHS" b="1" i="1" dirty="0" err="1" smtClean="0"/>
               <a:t>param</a:t>
             </a:r>
             <a:r>
-              <a:rPr lang="en-US" altLang="zh-CN" b="1" dirty="0" smtClean="0"/>
+              <a:rPr lang="en-US" altLang="zh-CHS" b="1" dirty="0" smtClean="0"/>
               <a:t>)</a:t>
             </a:r>
           </a:p>
           <a:p>
             <a:pPr lvl="1"/>
-            <a:endParaRPr lang="en-US" altLang="zh-CN" b="1" dirty="0" smtClean="0"/>
+            <a:endParaRPr lang="en-US" altLang="zh-CHS" b="1" dirty="0" smtClean="0"/>
           </a:p>
           <a:p>
             <a:pPr lvl="1">
               <a:buNone/>
             </a:pPr>
             <a:r>
-              <a:rPr lang="en-US" altLang="zh-CN" dirty="0" smtClean="0"/>
+              <a:rPr lang="en-US" altLang="zh-CHS" dirty="0" smtClean="0"/>
               <a:t>	Many parameters can be set through this function call.</a:t>
             </a:r>
           </a:p>
@@ -7783,7 +7798,7 @@
               <a:buNone/>
             </a:pPr>
             <a:r>
-              <a:rPr lang="en-US" altLang="zh-CN" dirty="0" smtClean="0"/>
+              <a:rPr lang="en-US" altLang="zh-CHS" dirty="0" smtClean="0"/>
               <a:t>	We only introduce what we need.</a:t>
             </a:r>
           </a:p>
@@ -7807,10 +7822,10 @@
           <a:lstStyle/>
           <a:p>
             <a:r>
-              <a:rPr lang="en-US" altLang="zh-CN" sz="3600" dirty="0" smtClean="0"/>
+              <a:rPr lang="en-US" altLang="zh-CHS" sz="3600" dirty="0" smtClean="0"/>
               <a:t>Main techniques we need</a:t>
             </a:r>
-            <a:endParaRPr lang="zh-CN" altLang="en-US" sz="3600" dirty="0"/>
+            <a:endParaRPr lang="zh-CHS" altLang="en-US" sz="3600" dirty="0"/>
           </a:p>
         </p:txBody>
       </p:sp>
@@ -7862,57 +7877,57 @@
           <a:lstStyle/>
           <a:p>
             <a:r>
-              <a:rPr lang="en-US" altLang="zh-CN" dirty="0" smtClean="0"/>
+              <a:rPr lang="en-US" altLang="zh-CHS" dirty="0" smtClean="0"/>
               <a:t>Texture in OpenGL</a:t>
             </a:r>
           </a:p>
           <a:p>
             <a:pPr lvl="1"/>
             <a:r>
-              <a:rPr lang="en-US" altLang="zh-CN" dirty="0" smtClean="0"/>
+              <a:rPr lang="en-US" altLang="zh-CHS" dirty="0" smtClean="0"/>
               <a:t>Set Texture Parameters</a:t>
             </a:r>
           </a:p>
           <a:p>
             <a:pPr lvl="2"/>
             <a:r>
-              <a:rPr lang="en-US" altLang="zh-CN" dirty="0" smtClean="0"/>
+              <a:rPr lang="en-US" altLang="zh-CHS" dirty="0" smtClean="0"/>
               <a:t>Filtering</a:t>
             </a:r>
           </a:p>
           <a:p>
             <a:pPr lvl="3"/>
             <a:r>
-              <a:rPr lang="en-US" altLang="zh-CN" dirty="0" smtClean="0"/>
+              <a:rPr lang="en-US" altLang="zh-CHS" dirty="0" smtClean="0"/>
               <a:t>Most pixels probably don’t correspond to a single unit of the texture.</a:t>
             </a:r>
           </a:p>
           <a:p>
             <a:pPr lvl="3"/>
             <a:r>
-              <a:rPr lang="en-US" altLang="zh-CN" dirty="0" smtClean="0"/>
+              <a:rPr lang="en-US" altLang="zh-CHS" dirty="0" smtClean="0"/>
               <a:t>Filtering decides how to choose or mix the texture units to display each pixel</a:t>
             </a:r>
           </a:p>
           <a:p>
             <a:pPr lvl="3"/>
-            <a:endParaRPr lang="en-US" altLang="zh-CN" dirty="0" smtClean="0"/>
+            <a:endParaRPr lang="en-US" altLang="zh-CHS" dirty="0" smtClean="0"/>
           </a:p>
           <a:p>
             <a:pPr lvl="3"/>
             <a:r>
-              <a:rPr lang="en-US" altLang="zh-CN" dirty="0" smtClean="0"/>
+              <a:rPr lang="en-US" altLang="zh-CHS" dirty="0" smtClean="0"/>
               <a:t>Filtering should be set for magnifying and minifying separately</a:t>
             </a:r>
           </a:p>
           <a:p>
             <a:pPr lvl="4"/>
             <a:r>
-              <a:rPr lang="en-US" altLang="zh-CN" dirty="0" err="1" smtClean="0"/>
+              <a:rPr lang="en-US" altLang="zh-CHS" dirty="0" err="1" smtClean="0"/>
               <a:t>pname</a:t>
             </a:r>
             <a:r>
-              <a:rPr lang="en-US" altLang="zh-CN" dirty="0" smtClean="0"/>
+              <a:rPr lang="en-US" altLang="zh-CHS" dirty="0" smtClean="0"/>
               <a:t> </a:t>
             </a:r>
           </a:p>
@@ -7921,7 +7936,7 @@
               <a:buNone/>
             </a:pPr>
             <a:r>
-              <a:rPr lang="en-US" altLang="zh-CN" dirty="0" smtClean="0"/>
+              <a:rPr lang="en-US" altLang="zh-CHS" dirty="0" smtClean="0"/>
               <a:t>	GL_TEXTURE_MAG_FILTER</a:t>
             </a:r>
           </a:p>
@@ -7930,7 +7945,7 @@
               <a:buNone/>
             </a:pPr>
             <a:r>
-              <a:rPr lang="en-US" altLang="zh-CN" dirty="0" smtClean="0"/>
+              <a:rPr lang="en-US" altLang="zh-CHS" dirty="0" smtClean="0"/>
               <a:t>	GL_TEXTURE_MIN_FILTER</a:t>
             </a:r>
           </a:p>
@@ -7954,10 +7969,10 @@
           <a:lstStyle/>
           <a:p>
             <a:r>
-              <a:rPr lang="en-US" altLang="zh-CN" sz="3600" dirty="0" smtClean="0"/>
+              <a:rPr lang="en-US" altLang="zh-CHS" sz="3600" dirty="0" smtClean="0"/>
               <a:t>Main techniques we need</a:t>
             </a:r>
-            <a:endParaRPr lang="zh-CN" altLang="en-US" sz="3600" dirty="0"/>
+            <a:endParaRPr lang="zh-CHS" altLang="en-US" sz="3600" dirty="0"/>
           </a:p>
         </p:txBody>
       </p:sp>
@@ -8009,38 +8024,38 @@
           <a:lstStyle/>
           <a:p>
             <a:r>
-              <a:rPr lang="en-US" altLang="zh-CN" dirty="0" smtClean="0"/>
+              <a:rPr lang="en-US" altLang="zh-CHS" dirty="0" smtClean="0"/>
               <a:t>Texture in OpenGL</a:t>
             </a:r>
           </a:p>
           <a:p>
             <a:pPr lvl="1"/>
             <a:r>
-              <a:rPr lang="en-US" altLang="zh-CN" dirty="0" smtClean="0"/>
+              <a:rPr lang="en-US" altLang="zh-CHS" dirty="0" smtClean="0"/>
               <a:t>Set Texture Parameters</a:t>
             </a:r>
           </a:p>
           <a:p>
             <a:pPr lvl="2"/>
             <a:r>
-              <a:rPr lang="en-US" altLang="zh-CN" dirty="0" smtClean="0"/>
+              <a:rPr lang="en-US" altLang="zh-CHS" dirty="0" smtClean="0"/>
               <a:t>Filtering</a:t>
             </a:r>
           </a:p>
           <a:p>
             <a:pPr lvl="3"/>
             <a:r>
-              <a:rPr lang="en-US" altLang="zh-CN" dirty="0" err="1" smtClean="0"/>
+              <a:rPr lang="en-US" altLang="zh-CHS" dirty="0" err="1" smtClean="0"/>
               <a:t>param</a:t>
             </a:r>
-            <a:endParaRPr lang="en-US" altLang="zh-CN" dirty="0" smtClean="0"/>
+            <a:endParaRPr lang="en-US" altLang="zh-CHS" dirty="0" smtClean="0"/>
           </a:p>
           <a:p>
             <a:pPr lvl="3">
               <a:buNone/>
             </a:pPr>
             <a:r>
-              <a:rPr lang="en-US" altLang="zh-CN" dirty="0" smtClean="0"/>
+              <a:rPr lang="en-US" altLang="zh-CHS" dirty="0" smtClean="0"/>
               <a:t>	For magnifying</a:t>
             </a:r>
           </a:p>
@@ -8049,7 +8064,7 @@
               <a:buNone/>
             </a:pPr>
             <a:r>
-              <a:rPr lang="en-US" altLang="zh-CN" dirty="0" smtClean="0"/>
+              <a:rPr lang="en-US" altLang="zh-CHS" dirty="0" smtClean="0"/>
               <a:t>	GL_NEAREST/GL_LINEAR</a:t>
             </a:r>
           </a:p>
@@ -8058,7 +8073,7 @@
               <a:buNone/>
             </a:pPr>
             <a:r>
-              <a:rPr lang="en-US" altLang="zh-CN" dirty="0" smtClean="0"/>
+              <a:rPr lang="en-US" altLang="zh-CHS" dirty="0" smtClean="0"/>
               <a:t>	For minifying</a:t>
             </a:r>
           </a:p>
@@ -8067,7 +8082,7 @@
               <a:buNone/>
             </a:pPr>
             <a:r>
-              <a:rPr lang="en-US" altLang="zh-CN" dirty="0" smtClean="0"/>
+              <a:rPr lang="en-US" altLang="zh-CHS" dirty="0" smtClean="0"/>
               <a:t>	GL_NEAREST/GL_LINEAR</a:t>
             </a:r>
           </a:p>
@@ -8076,7 +8091,7 @@
               <a:buNone/>
             </a:pPr>
             <a:r>
-              <a:rPr lang="en-US" altLang="zh-CN" dirty="0" smtClean="0"/>
+              <a:rPr lang="en-US" altLang="zh-CHS" dirty="0" smtClean="0"/>
               <a:t>	GL_NEAREST_MIPMAP_NEAREST</a:t>
             </a:r>
           </a:p>
@@ -8085,7 +8100,7 @@
               <a:buNone/>
             </a:pPr>
             <a:r>
-              <a:rPr lang="en-US" altLang="zh-CN" dirty="0" smtClean="0"/>
+              <a:rPr lang="en-US" altLang="zh-CHS" dirty="0" smtClean="0"/>
               <a:t>	GL_NEAREST_MIPMAP_LINEAR</a:t>
             </a:r>
           </a:p>
@@ -8094,7 +8109,7 @@
               <a:buNone/>
             </a:pPr>
             <a:r>
-              <a:rPr lang="en-US" altLang="zh-CN" dirty="0" smtClean="0"/>
+              <a:rPr lang="en-US" altLang="zh-CHS" dirty="0" smtClean="0"/>
               <a:t>	GL_LINEAR_MIPMAP_NEAREST</a:t>
             </a:r>
           </a:p>
@@ -8103,13 +8118,13 @@
               <a:buNone/>
             </a:pPr>
             <a:r>
-              <a:rPr lang="en-US" altLang="zh-CN" dirty="0" smtClean="0"/>
+              <a:rPr lang="en-US" altLang="zh-CHS" dirty="0" smtClean="0"/>
               <a:t>	GL_LINEAR_MIPMAP_LINEAR</a:t>
             </a:r>
           </a:p>
           <a:p>
             <a:pPr lvl="4"/>
-            <a:endParaRPr lang="en-US" altLang="zh-CN" dirty="0" smtClean="0"/>
+            <a:endParaRPr lang="en-US" altLang="zh-CHS" dirty="0" smtClean="0"/>
           </a:p>
         </p:txBody>
       </p:sp>
@@ -8131,10 +8146,10 @@
           <a:lstStyle/>
           <a:p>
             <a:r>
-              <a:rPr lang="en-US" altLang="zh-CN" sz="3600" dirty="0" smtClean="0"/>
+              <a:rPr lang="en-US" altLang="zh-CHS" sz="3600" dirty="0" smtClean="0"/>
               <a:t>Main techniques we need</a:t>
             </a:r>
-            <a:endParaRPr lang="zh-CN" altLang="en-US" sz="3600" dirty="0"/>
+            <a:endParaRPr lang="zh-CHS" altLang="en-US" sz="3600" dirty="0"/>
           </a:p>
         </p:txBody>
       </p:sp>
@@ -8176,7 +8191,7 @@
           <a:lstStyle/>
           <a:p>
             <a:pPr algn="ctr"/>
-            <a:endParaRPr lang="zh-CN" altLang="en-US"/>
+            <a:endParaRPr lang="zh-CHS" altLang="en-US"/>
           </a:p>
         </p:txBody>
       </p:sp>
@@ -8228,52 +8243,52 @@
           <a:lstStyle/>
           <a:p>
             <a:r>
-              <a:rPr lang="en-US" altLang="zh-CN" dirty="0" smtClean="0"/>
+              <a:rPr lang="en-US" altLang="zh-CHS" dirty="0" smtClean="0"/>
               <a:t>Texture in OpenGL</a:t>
             </a:r>
           </a:p>
           <a:p>
             <a:pPr lvl="1"/>
             <a:r>
-              <a:rPr lang="en-US" altLang="zh-CN" dirty="0" smtClean="0"/>
+              <a:rPr lang="en-US" altLang="zh-CHS" dirty="0" smtClean="0"/>
               <a:t>Set Texture Parameters</a:t>
             </a:r>
           </a:p>
           <a:p>
             <a:pPr lvl="2"/>
             <a:r>
-              <a:rPr lang="en-US" altLang="zh-CN" dirty="0" smtClean="0"/>
+              <a:rPr lang="en-US" altLang="zh-CHS" dirty="0" smtClean="0"/>
               <a:t>GL_NEAREST</a:t>
             </a:r>
           </a:p>
           <a:p>
             <a:pPr lvl="3"/>
             <a:r>
-              <a:rPr lang="en-US" altLang="zh-CN" dirty="0" smtClean="0"/>
+              <a:rPr lang="en-US" altLang="zh-CHS" dirty="0" smtClean="0"/>
               <a:t>Pick the nearest texture unit for each pixel</a:t>
             </a:r>
           </a:p>
           <a:p>
             <a:pPr lvl="2"/>
             <a:r>
-              <a:rPr lang="en-US" altLang="zh-CN" dirty="0" smtClean="0"/>
+              <a:rPr lang="en-US" altLang="zh-CHS" dirty="0" smtClean="0"/>
               <a:t>GL_LINEAR</a:t>
             </a:r>
           </a:p>
           <a:p>
             <a:pPr lvl="3"/>
             <a:r>
-              <a:rPr lang="en-US" altLang="zh-CN" dirty="0" smtClean="0"/>
+              <a:rPr lang="en-US" altLang="zh-CHS" dirty="0" smtClean="0"/>
               <a:t>Linear combination of corresponding texture units</a:t>
             </a:r>
           </a:p>
           <a:p>
             <a:pPr lvl="3"/>
-            <a:endParaRPr lang="en-US" altLang="zh-CN" dirty="0" smtClean="0"/>
+            <a:endParaRPr lang="en-US" altLang="zh-CHS" dirty="0" smtClean="0"/>
           </a:p>
           <a:p>
             <a:pPr lvl="4"/>
-            <a:endParaRPr lang="en-US" altLang="zh-CN" dirty="0" smtClean="0"/>
+            <a:endParaRPr lang="en-US" altLang="zh-CHS" dirty="0" smtClean="0"/>
           </a:p>
         </p:txBody>
       </p:sp>
@@ -8295,10 +8310,10 @@
           <a:lstStyle/>
           <a:p>
             <a:r>
-              <a:rPr lang="en-US" altLang="zh-CN" sz="3600" dirty="0" smtClean="0"/>
+              <a:rPr lang="en-US" altLang="zh-CHS" sz="3600" dirty="0" smtClean="0"/>
               <a:t>Main techniques we need</a:t>
             </a:r>
-            <a:endParaRPr lang="zh-CN" altLang="en-US" sz="3600" dirty="0"/>
+            <a:endParaRPr lang="zh-CHS" altLang="en-US" sz="3600" dirty="0"/>
           </a:p>
         </p:txBody>
       </p:sp>

</xml_diff>